<commit_message>
pushing a powerpoint update
pushing an update to the powerpoint
</commit_message>
<xml_diff>
--- a/Final Project Presentation.pptx
+++ b/Final Project Presentation.pptx
@@ -140,7 +140,7 @@
   <pc:docChgLst>
     <pc:chgData name="Stephen Desilets" userId="2df8f4c56c849a7f" providerId="LiveId" clId="{B48F43DB-3888-4FF6-B9C2-531E0ECC3ED3}"/>
     <pc:docChg chg="undo custSel addSld delSld modSld delMainMaster">
-      <pc:chgData name="Stephen Desilets" userId="2df8f4c56c849a7f" providerId="LiveId" clId="{B48F43DB-3888-4FF6-B9C2-531E0ECC3ED3}" dt="2023-08-12T17:06:40.392" v="22512" actId="20577"/>
+      <pc:chgData name="Stephen Desilets" userId="2df8f4c56c849a7f" providerId="LiveId" clId="{B48F43DB-3888-4FF6-B9C2-531E0ECC3ED3}" dt="2023-08-17T18:53:56.367" v="22534" actId="20577"/>
       <pc:docMkLst>
         <pc:docMk/>
       </pc:docMkLst>
@@ -469,7 +469,7 @@
         </pc:spChg>
       </pc:sldChg>
       <pc:sldChg chg="delSp modSp add mod">
-        <pc:chgData name="Stephen Desilets" userId="2df8f4c56c849a7f" providerId="LiveId" clId="{B48F43DB-3888-4FF6-B9C2-531E0ECC3ED3}" dt="2023-08-11T02:32:22.903" v="9510" actId="20577"/>
+        <pc:chgData name="Stephen Desilets" userId="2df8f4c56c849a7f" providerId="LiveId" clId="{B48F43DB-3888-4FF6-B9C2-531E0ECC3ED3}" dt="2023-08-17T17:38:06.475" v="22513" actId="20577"/>
         <pc:sldMkLst>
           <pc:docMk/>
           <pc:sldMk cId="3019365730" sldId="276"/>
@@ -539,7 +539,7 @@
           </ac:spMkLst>
         </pc:spChg>
         <pc:spChg chg="mod">
-          <ac:chgData name="Stephen Desilets" userId="2df8f4c56c849a7f" providerId="LiveId" clId="{B48F43DB-3888-4FF6-B9C2-531E0ECC3ED3}" dt="2023-08-11T02:32:22.903" v="9510" actId="20577"/>
+          <ac:chgData name="Stephen Desilets" userId="2df8f4c56c849a7f" providerId="LiveId" clId="{B48F43DB-3888-4FF6-B9C2-531E0ECC3ED3}" dt="2023-08-17T17:38:06.475" v="22513" actId="20577"/>
           <ac:spMkLst>
             <pc:docMk/>
             <pc:sldMk cId="3019365730" sldId="276"/>
@@ -1303,7 +1303,7 @@
         </pc:spChg>
       </pc:sldChg>
       <pc:sldChg chg="delSp modSp add mod">
-        <pc:chgData name="Stephen Desilets" userId="2df8f4c56c849a7f" providerId="LiveId" clId="{B48F43DB-3888-4FF6-B9C2-531E0ECC3ED3}" dt="2023-08-11T06:11:15.831" v="14877" actId="20577"/>
+        <pc:chgData name="Stephen Desilets" userId="2df8f4c56c849a7f" providerId="LiveId" clId="{B48F43DB-3888-4FF6-B9C2-531E0ECC3ED3}" dt="2023-08-17T18:53:56.367" v="22534" actId="20577"/>
         <pc:sldMkLst>
           <pc:docMk/>
           <pc:sldMk cId="3857785275" sldId="288"/>
@@ -1317,7 +1317,7 @@
           </ac:spMkLst>
         </pc:spChg>
         <pc:spChg chg="mod">
-          <ac:chgData name="Stephen Desilets" userId="2df8f4c56c849a7f" providerId="LiveId" clId="{B48F43DB-3888-4FF6-B9C2-531E0ECC3ED3}" dt="2023-08-11T04:44:47.656" v="12932" actId="20577"/>
+          <ac:chgData name="Stephen Desilets" userId="2df8f4c56c849a7f" providerId="LiveId" clId="{B48F43DB-3888-4FF6-B9C2-531E0ECC3ED3}" dt="2023-08-17T18:53:56.367" v="22534" actId="20577"/>
           <ac:spMkLst>
             <pc:docMk/>
             <pc:sldMk cId="3857785275" sldId="288"/>
@@ -1366,7 +1366,7 @@
         </pc:cxnChg>
       </pc:sldChg>
       <pc:sldChg chg="addSp modSp add mod">
-        <pc:chgData name="Stephen Desilets" userId="2df8f4c56c849a7f" providerId="LiveId" clId="{B48F43DB-3888-4FF6-B9C2-531E0ECC3ED3}" dt="2023-08-11T05:04:04.822" v="13040" actId="20577"/>
+        <pc:chgData name="Stephen Desilets" userId="2df8f4c56c849a7f" providerId="LiveId" clId="{B48F43DB-3888-4FF6-B9C2-531E0ECC3ED3}" dt="2023-08-17T18:42:21.179" v="22532" actId="20577"/>
         <pc:sldMkLst>
           <pc:docMk/>
           <pc:sldMk cId="4028187422" sldId="289"/>
@@ -1412,7 +1412,7 @@
           </ac:spMkLst>
         </pc:spChg>
         <pc:graphicFrameChg chg="mod modGraphic">
-          <ac:chgData name="Stephen Desilets" userId="2df8f4c56c849a7f" providerId="LiveId" clId="{B48F43DB-3888-4FF6-B9C2-531E0ECC3ED3}" dt="2023-08-11T04:32:20.094" v="11920" actId="20577"/>
+          <ac:chgData name="Stephen Desilets" userId="2df8f4c56c849a7f" providerId="LiveId" clId="{B48F43DB-3888-4FF6-B9C2-531E0ECC3ED3}" dt="2023-08-17T18:42:21.179" v="22532" actId="20577"/>
           <ac:graphicFrameMkLst>
             <pc:docMk/>
             <pc:sldMk cId="4028187422" sldId="289"/>
@@ -2831,7 +2831,7 @@
           <a:p>
             <a:fld id="{046326D4-DBBB-4FDF-918E-E5ACF7C59FAB}" type="datetimeFigureOut">
               <a:rPr lang="en-US" smtClean="0"/>
-              <a:t>8/12/2023</a:t>
+              <a:t>8/17/2023</a:t>
             </a:fld>
             <a:endParaRPr lang="en-US"/>
           </a:p>
@@ -3329,7 +3329,7 @@
           <a:p>
             <a:fld id="{6900ED20-245A-4176-8383-E64D97094D5B}" type="datetimeFigureOut">
               <a:rPr lang="en-US" smtClean="0"/>
-              <a:t>8/12/2023</a:t>
+              <a:t>8/17/2023</a:t>
             </a:fld>
             <a:endParaRPr lang="en-US"/>
           </a:p>
@@ -3527,7 +3527,7 @@
           <a:p>
             <a:fld id="{6900ED20-245A-4176-8383-E64D97094D5B}" type="datetimeFigureOut">
               <a:rPr lang="en-US" smtClean="0"/>
-              <a:t>8/12/2023</a:t>
+              <a:t>8/17/2023</a:t>
             </a:fld>
             <a:endParaRPr lang="en-US"/>
           </a:p>
@@ -3735,7 +3735,7 @@
           <a:p>
             <a:fld id="{6900ED20-245A-4176-8383-E64D97094D5B}" type="datetimeFigureOut">
               <a:rPr lang="en-US" smtClean="0"/>
-              <a:t>8/12/2023</a:t>
+              <a:t>8/17/2023</a:t>
             </a:fld>
             <a:endParaRPr lang="en-US"/>
           </a:p>
@@ -3933,7 +3933,7 @@
           <a:p>
             <a:fld id="{6900ED20-245A-4176-8383-E64D97094D5B}" type="datetimeFigureOut">
               <a:rPr lang="en-US" smtClean="0"/>
-              <a:t>8/12/2023</a:t>
+              <a:t>8/17/2023</a:t>
             </a:fld>
             <a:endParaRPr lang="en-US"/>
           </a:p>
@@ -4208,7 +4208,7 @@
           <a:p>
             <a:fld id="{6900ED20-245A-4176-8383-E64D97094D5B}" type="datetimeFigureOut">
               <a:rPr lang="en-US" smtClean="0"/>
-              <a:t>8/12/2023</a:t>
+              <a:t>8/17/2023</a:t>
             </a:fld>
             <a:endParaRPr lang="en-US"/>
           </a:p>
@@ -4473,7 +4473,7 @@
           <a:p>
             <a:fld id="{6900ED20-245A-4176-8383-E64D97094D5B}" type="datetimeFigureOut">
               <a:rPr lang="en-US" smtClean="0"/>
-              <a:t>8/12/2023</a:t>
+              <a:t>8/17/2023</a:t>
             </a:fld>
             <a:endParaRPr lang="en-US"/>
           </a:p>
@@ -4885,7 +4885,7 @@
           <a:p>
             <a:fld id="{6900ED20-245A-4176-8383-E64D97094D5B}" type="datetimeFigureOut">
               <a:rPr lang="en-US" smtClean="0"/>
-              <a:t>8/12/2023</a:t>
+              <a:t>8/17/2023</a:t>
             </a:fld>
             <a:endParaRPr lang="en-US"/>
           </a:p>
@@ -5026,7 +5026,7 @@
           <a:p>
             <a:fld id="{6900ED20-245A-4176-8383-E64D97094D5B}" type="datetimeFigureOut">
               <a:rPr lang="en-US" smtClean="0"/>
-              <a:t>8/12/2023</a:t>
+              <a:t>8/17/2023</a:t>
             </a:fld>
             <a:endParaRPr lang="en-US"/>
           </a:p>
@@ -5139,7 +5139,7 @@
           <a:p>
             <a:fld id="{6900ED20-245A-4176-8383-E64D97094D5B}" type="datetimeFigureOut">
               <a:rPr lang="en-US" smtClean="0"/>
-              <a:t>8/12/2023</a:t>
+              <a:t>8/17/2023</a:t>
             </a:fld>
             <a:endParaRPr lang="en-US"/>
           </a:p>
@@ -5450,7 +5450,7 @@
           <a:p>
             <a:fld id="{6900ED20-245A-4176-8383-E64D97094D5B}" type="datetimeFigureOut">
               <a:rPr lang="en-US" smtClean="0"/>
-              <a:t>8/12/2023</a:t>
+              <a:t>8/17/2023</a:t>
             </a:fld>
             <a:endParaRPr lang="en-US"/>
           </a:p>
@@ -5738,7 +5738,7 @@
           <a:p>
             <a:fld id="{6900ED20-245A-4176-8383-E64D97094D5B}" type="datetimeFigureOut">
               <a:rPr lang="en-US" smtClean="0"/>
-              <a:t>8/12/2023</a:t>
+              <a:t>8/17/2023</a:t>
             </a:fld>
             <a:endParaRPr lang="en-US"/>
           </a:p>
@@ -5979,7 +5979,7 @@
           <a:p>
             <a:fld id="{6900ED20-245A-4176-8383-E64D97094D5B}" type="datetimeFigureOut">
               <a:rPr lang="en-US" smtClean="0"/>
-              <a:t>8/12/2023</a:t>
+              <a:t>8/17/2023</a:t>
             </a:fld>
             <a:endParaRPr lang="en-US"/>
           </a:p>
@@ -7041,7 +7041,7 @@
           <p:nvPr>
             <p:extLst>
               <p:ext uri="{D42A27DB-BD31-4B8C-83A1-F6EECF244321}">
-                <p14:modId xmlns:p14="http://schemas.microsoft.com/office/powerpoint/2010/main" val="1250090570"/>
+                <p14:modId xmlns:p14="http://schemas.microsoft.com/office/powerpoint/2010/main" val="2210927289"/>
               </p:ext>
             </p:extLst>
           </p:nvPr>
@@ -7397,7 +7397,7 @@
                           </a:solidFill>
                           <a:latin typeface="Open sans"/>
                         </a:rPr>
-                        <a:t>Brewery</a:t>
+                        <a:t>Demand Point</a:t>
                       </a:r>
                     </a:p>
                   </a:txBody>
@@ -12676,7 +12676,7 @@
             </a:r>
             <a:r>
               <a:rPr lang="en-US" sz="1200" dirty="0"/>
-              <a:t> in Python. The sensitivity report contained information regarding the 350 constraints and the 57 variables. Below, we summarize key findings from our review of this sensitivity report.</a:t>
+              <a:t> in Python. The sensitivity report contained information regarding the 370 constraints and the 57 variables. Below, we summarize key findings from our review of this sensitivity report.</a:t>
             </a:r>
           </a:p>
         </p:txBody>
@@ -17884,7 +17884,7 @@
                 </a:solidFill>
                 <a:latin typeface="Calibri" panose="020F0502020204030204"/>
               </a:rPr>
-              <a:t> unique costs to ship liquids along the</a:t>
+              <a:t> unique costs to ship liquids along the </a:t>
             </a:r>
             <a:r>
               <a:rPr kumimoji="0" lang="en-US" sz="1100" b="0" i="0" u="none" strike="noStrike" kern="1200" cap="none" spc="0" normalizeH="0" baseline="0" noProof="0" dirty="0">
@@ -19940,41 +19940,7 @@
                 <a:ea typeface="+mj-ea"/>
                 <a:cs typeface="+mj-cs"/>
               </a:rPr>
-              <a:t>The value of the objective function and the left-hand side of the constraints are proportional to the level of activity </a:t>
-            </a:r>
-            <a:r>
-              <a:rPr kumimoji="0" lang="en-US" sz="1200" b="0" i="0" u="none" strike="noStrike" kern="1200" cap="none" spc="0" normalizeH="0" baseline="0" noProof="0">
-                <a:ln>
-                  <a:noFill/>
-                </a:ln>
-                <a:solidFill>
-                  <a:srgbClr val="000000"/>
-                </a:solidFill>
-                <a:effectLst/>
-                <a:uLnTx/>
-                <a:uFillTx/>
-                <a:latin typeface="Calibri" panose="020F0502020204030204"/>
-                <a:ea typeface="+mj-ea"/>
-                <a:cs typeface="+mj-cs"/>
-              </a:rPr>
-              <a:t>associated with </a:t>
-            </a:r>
-            <a:r>
-              <a:rPr kumimoji="0" lang="en-US" sz="1200" b="0" i="0" u="none" strike="noStrike" kern="1200" cap="none" spc="0" normalizeH="0" baseline="0" noProof="0" dirty="0">
-                <a:ln>
-                  <a:noFill/>
-                </a:ln>
-                <a:solidFill>
-                  <a:srgbClr val="000000"/>
-                </a:solidFill>
-                <a:effectLst/>
-                <a:uLnTx/>
-                <a:uFillTx/>
-                <a:latin typeface="Calibri" panose="020F0502020204030204"/>
-                <a:ea typeface="+mj-ea"/>
-                <a:cs typeface="+mj-cs"/>
-              </a:rPr>
-              <a:t>commodities transported and distributed</a:t>
+              <a:t>The value of the objective function and the left-hand side of the constraints are proportional to the level of activity associated with commodities transported and distributed</a:t>
             </a:r>
           </a:p>
           <a:p>

</xml_diff>

<commit_message>
Pushing Proofreading Edits to Powerpoint
proofread powerpoint
</commit_message>
<xml_diff>
--- a/Final Project Presentation.pptx
+++ b/Final Project Presentation.pptx
@@ -130,7 +130,7 @@
 <file path=ppt/revisionInfo.xml><?xml version="1.0" encoding="utf-8"?>
 <p1510:revInfo xmlns:a="http://schemas.openxmlformats.org/drawingml/2006/main" xmlns:r="http://schemas.openxmlformats.org/officeDocument/2006/relationships" xmlns:p1510="http://schemas.microsoft.com/office/powerpoint/2015/10/main">
   <p1510:revLst>
-    <p1510:client id="{B48F43DB-3888-4FF6-B9C2-531E0ECC3ED3}" v="634" dt="2023-08-12T07:37:06.960"/>
+    <p1510:client id="{B48F43DB-3888-4FF6-B9C2-531E0ECC3ED3}" v="651" dt="2023-08-22T23:36:47.122"/>
   </p1510:revLst>
 </p1510:revInfo>
 </file>
@@ -140,7 +140,7 @@
   <pc:docChgLst>
     <pc:chgData name="Stephen Desilets" userId="2df8f4c56c849a7f" providerId="LiveId" clId="{B48F43DB-3888-4FF6-B9C2-531E0ECC3ED3}"/>
     <pc:docChg chg="undo custSel addSld delSld modSld delMainMaster">
-      <pc:chgData name="Stephen Desilets" userId="2df8f4c56c849a7f" providerId="LiveId" clId="{B48F43DB-3888-4FF6-B9C2-531E0ECC3ED3}" dt="2023-08-17T18:53:56.367" v="22534" actId="20577"/>
+      <pc:chgData name="Stephen Desilets" userId="2df8f4c56c849a7f" providerId="LiveId" clId="{B48F43DB-3888-4FF6-B9C2-531E0ECC3ED3}" dt="2023-08-22T23:48:00.825" v="22709" actId="20577"/>
       <pc:docMkLst>
         <pc:docMk/>
       </pc:docMkLst>
@@ -739,13 +739,13 @@
         </pc:graphicFrameChg>
       </pc:sldChg>
       <pc:sldChg chg="addSp delSp modSp add mod">
-        <pc:chgData name="Stephen Desilets" userId="2df8f4c56c849a7f" providerId="LiveId" clId="{B48F43DB-3888-4FF6-B9C2-531E0ECC3ED3}" dt="2023-08-12T08:02:58.495" v="22510" actId="20577"/>
+        <pc:chgData name="Stephen Desilets" userId="2df8f4c56c849a7f" providerId="LiveId" clId="{B48F43DB-3888-4FF6-B9C2-531E0ECC3ED3}" dt="2023-08-22T23:42:25.339" v="22666" actId="20577"/>
         <pc:sldMkLst>
           <pc:docMk/>
           <pc:sldMk cId="2562565733" sldId="285"/>
         </pc:sldMkLst>
         <pc:spChg chg="mod">
-          <ac:chgData name="Stephen Desilets" userId="2df8f4c56c849a7f" providerId="LiveId" clId="{B48F43DB-3888-4FF6-B9C2-531E0ECC3ED3}" dt="2023-08-12T07:16:37.964" v="21106" actId="14100"/>
+          <ac:chgData name="Stephen Desilets" userId="2df8f4c56c849a7f" providerId="LiveId" clId="{B48F43DB-3888-4FF6-B9C2-531E0ECC3ED3}" dt="2023-08-22T23:42:08.588" v="22663" actId="20577"/>
           <ac:spMkLst>
             <pc:docMk/>
             <pc:sldMk cId="2562565733" sldId="285"/>
@@ -833,7 +833,7 @@
           </ac:spMkLst>
         </pc:spChg>
         <pc:spChg chg="add mod">
-          <ac:chgData name="Stephen Desilets" userId="2df8f4c56c849a7f" providerId="LiveId" clId="{B48F43DB-3888-4FF6-B9C2-531E0ECC3ED3}" dt="2023-08-12T08:02:58.495" v="22510" actId="20577"/>
+          <ac:chgData name="Stephen Desilets" userId="2df8f4c56c849a7f" providerId="LiveId" clId="{B48F43DB-3888-4FF6-B9C2-531E0ECC3ED3}" dt="2023-08-22T23:42:25.339" v="22666" actId="20577"/>
           <ac:spMkLst>
             <pc:docMk/>
             <pc:sldMk cId="2562565733" sldId="285"/>
@@ -841,7 +841,7 @@
           </ac:spMkLst>
         </pc:spChg>
         <pc:spChg chg="add mod">
-          <ac:chgData name="Stephen Desilets" userId="2df8f4c56c849a7f" providerId="LiveId" clId="{B48F43DB-3888-4FF6-B9C2-531E0ECC3ED3}" dt="2023-08-12T07:16:32.625" v="21105" actId="1037"/>
+          <ac:chgData name="Stephen Desilets" userId="2df8f4c56c849a7f" providerId="LiveId" clId="{B48F43DB-3888-4FF6-B9C2-531E0ECC3ED3}" dt="2023-08-22T23:41:48.750" v="22662" actId="1036"/>
           <ac:spMkLst>
             <pc:docMk/>
             <pc:sldMk cId="2562565733" sldId="285"/>
@@ -881,7 +881,7 @@
           </ac:cxnSpMkLst>
         </pc:cxnChg>
         <pc:cxnChg chg="add mod">
-          <ac:chgData name="Stephen Desilets" userId="2df8f4c56c849a7f" providerId="LiveId" clId="{B48F43DB-3888-4FF6-B9C2-531E0ECC3ED3}" dt="2023-08-12T07:16:32.625" v="21105" actId="1037"/>
+          <ac:chgData name="Stephen Desilets" userId="2df8f4c56c849a7f" providerId="LiveId" clId="{B48F43DB-3888-4FF6-B9C2-531E0ECC3ED3}" dt="2023-08-22T23:41:48.750" v="22662" actId="1036"/>
           <ac:cxnSpMkLst>
             <pc:docMk/>
             <pc:sldMk cId="2562565733" sldId="285"/>
@@ -890,7 +890,7 @@
         </pc:cxnChg>
       </pc:sldChg>
       <pc:sldChg chg="addSp delSp modSp add mod">
-        <pc:chgData name="Stephen Desilets" userId="2df8f4c56c849a7f" providerId="LiveId" clId="{B48F43DB-3888-4FF6-B9C2-531E0ECC3ED3}" dt="2023-08-10T23:32:08.522" v="6244" actId="552"/>
+        <pc:chgData name="Stephen Desilets" userId="2df8f4c56c849a7f" providerId="LiveId" clId="{B48F43DB-3888-4FF6-B9C2-531E0ECC3ED3}" dt="2023-08-22T23:40:06.978" v="22658" actId="6549"/>
         <pc:sldMkLst>
           <pc:docMk/>
           <pc:sldMk cId="1842220797" sldId="286"/>
@@ -928,7 +928,7 @@
           </ac:spMkLst>
         </pc:spChg>
         <pc:spChg chg="mod">
-          <ac:chgData name="Stephen Desilets" userId="2df8f4c56c849a7f" providerId="LiveId" clId="{B48F43DB-3888-4FF6-B9C2-531E0ECC3ED3}" dt="2023-08-10T23:00:02.522" v="3383" actId="1035"/>
+          <ac:chgData name="Stephen Desilets" userId="2df8f4c56c849a7f" providerId="LiveId" clId="{B48F43DB-3888-4FF6-B9C2-531E0ECC3ED3}" dt="2023-08-22T23:37:39.088" v="22537" actId="20577"/>
           <ac:spMkLst>
             <pc:docMk/>
             <pc:sldMk cId="1842220797" sldId="286"/>
@@ -952,7 +952,7 @@
           </ac:spMkLst>
         </pc:spChg>
         <pc:spChg chg="mod">
-          <ac:chgData name="Stephen Desilets" userId="2df8f4c56c849a7f" providerId="LiveId" clId="{B48F43DB-3888-4FF6-B9C2-531E0ECC3ED3}" dt="2023-08-10T23:00:02.522" v="3383" actId="1035"/>
+          <ac:chgData name="Stephen Desilets" userId="2df8f4c56c849a7f" providerId="LiveId" clId="{B48F43DB-3888-4FF6-B9C2-531E0ECC3ED3}" dt="2023-08-22T23:38:02.885" v="22549" actId="20577"/>
           <ac:spMkLst>
             <pc:docMk/>
             <pc:sldMk cId="1842220797" sldId="286"/>
@@ -968,7 +968,7 @@
           </ac:spMkLst>
         </pc:spChg>
         <pc:spChg chg="mod">
-          <ac:chgData name="Stephen Desilets" userId="2df8f4c56c849a7f" providerId="LiveId" clId="{B48F43DB-3888-4FF6-B9C2-531E0ECC3ED3}" dt="2023-08-10T23:00:02.522" v="3383" actId="1035"/>
+          <ac:chgData name="Stephen Desilets" userId="2df8f4c56c849a7f" providerId="LiveId" clId="{B48F43DB-3888-4FF6-B9C2-531E0ECC3ED3}" dt="2023-08-22T23:40:06.978" v="22658" actId="6549"/>
           <ac:spMkLst>
             <pc:docMk/>
             <pc:sldMk cId="1842220797" sldId="286"/>
@@ -1145,7 +1145,7 @@
         </pc:cxnChg>
       </pc:sldChg>
       <pc:sldChg chg="delSp modSp add mod">
-        <pc:chgData name="Stephen Desilets" userId="2df8f4c56c849a7f" providerId="LiveId" clId="{B48F43DB-3888-4FF6-B9C2-531E0ECC3ED3}" dt="2023-08-10T23:28:10.321" v="6191" actId="20577"/>
+        <pc:chgData name="Stephen Desilets" userId="2df8f4c56c849a7f" providerId="LiveId" clId="{B48F43DB-3888-4FF6-B9C2-531E0ECC3ED3}" dt="2023-08-22T23:48:00.825" v="22709" actId="20577"/>
         <pc:sldMkLst>
           <pc:docMk/>
           <pc:sldMk cId="411543301" sldId="287"/>
@@ -1191,7 +1191,7 @@
           </ac:spMkLst>
         </pc:spChg>
         <pc:spChg chg="mod">
-          <ac:chgData name="Stephen Desilets" userId="2df8f4c56c849a7f" providerId="LiveId" clId="{B48F43DB-3888-4FF6-B9C2-531E0ECC3ED3}" dt="2023-08-10T23:22:53.890" v="4944" actId="20577"/>
+          <ac:chgData name="Stephen Desilets" userId="2df8f4c56c849a7f" providerId="LiveId" clId="{B48F43DB-3888-4FF6-B9C2-531E0ECC3ED3}" dt="2023-08-22T23:47:35.051" v="22686" actId="20577"/>
           <ac:spMkLst>
             <pc:docMk/>
             <pc:sldMk cId="411543301" sldId="287"/>
@@ -1199,7 +1199,7 @@
           </ac:spMkLst>
         </pc:spChg>
         <pc:spChg chg="mod">
-          <ac:chgData name="Stephen Desilets" userId="2df8f4c56c849a7f" providerId="LiveId" clId="{B48F43DB-3888-4FF6-B9C2-531E0ECC3ED3}" dt="2023-08-10T23:28:10.321" v="6191" actId="20577"/>
+          <ac:chgData name="Stephen Desilets" userId="2df8f4c56c849a7f" providerId="LiveId" clId="{B48F43DB-3888-4FF6-B9C2-531E0ECC3ED3}" dt="2023-08-22T23:47:49.068" v="22699" actId="20577"/>
           <ac:spMkLst>
             <pc:docMk/>
             <pc:sldMk cId="411543301" sldId="287"/>
@@ -1223,7 +1223,7 @@
           </ac:spMkLst>
         </pc:spChg>
         <pc:spChg chg="mod">
-          <ac:chgData name="Stephen Desilets" userId="2df8f4c56c849a7f" providerId="LiveId" clId="{B48F43DB-3888-4FF6-B9C2-531E0ECC3ED3}" dt="2023-08-10T23:25:55.105" v="5639" actId="20577"/>
+          <ac:chgData name="Stephen Desilets" userId="2df8f4c56c849a7f" providerId="LiveId" clId="{B48F43DB-3888-4FF6-B9C2-531E0ECC3ED3}" dt="2023-08-22T23:48:00.825" v="22709" actId="20577"/>
           <ac:spMkLst>
             <pc:docMk/>
             <pc:sldMk cId="411543301" sldId="287"/>
@@ -2798,7 +2798,7 @@
             </a:lvl1pPr>
           </a:lstStyle>
           <a:p>
-            <a:endParaRPr lang="en-US"/>
+            <a:endParaRPr lang="en-US" dirty="0"/>
           </a:p>
         </p:txBody>
       </p:sp>
@@ -2831,9 +2831,9 @@
           <a:p>
             <a:fld id="{046326D4-DBBB-4FDF-918E-E5ACF7C59FAB}" type="datetimeFigureOut">
               <a:rPr lang="en-US" smtClean="0"/>
-              <a:t>8/17/2023</a:t>
+              <a:t>8/22/2023</a:t>
             </a:fld>
-            <a:endParaRPr lang="en-US"/>
+            <a:endParaRPr lang="en-US" dirty="0"/>
           </a:p>
         </p:txBody>
       </p:sp>
@@ -2866,7 +2866,7 @@
           <a:bodyPr vert="horz" lIns="91440" tIns="45720" rIns="91440" bIns="45720" rtlCol="0" anchor="ctr"/>
           <a:lstStyle/>
           <a:p>
-            <a:endParaRPr lang="en-US"/>
+            <a:endParaRPr lang="en-US" dirty="0"/>
           </a:p>
         </p:txBody>
       </p:sp>
@@ -2956,7 +2956,7 @@
             </a:lvl1pPr>
           </a:lstStyle>
           <a:p>
-            <a:endParaRPr lang="en-US"/>
+            <a:endParaRPr lang="en-US" dirty="0"/>
           </a:p>
         </p:txBody>
       </p:sp>
@@ -2991,7 +2991,7 @@
               <a:rPr lang="en-US" smtClean="0"/>
               <a:t>‹#›</a:t>
             </a:fld>
-            <a:endParaRPr lang="en-US"/>
+            <a:endParaRPr lang="en-US" dirty="0"/>
           </a:p>
         </p:txBody>
       </p:sp>
@@ -3165,7 +3165,7 @@
               <a:rPr lang="en-US" smtClean="0"/>
               <a:t>8</a:t>
             </a:fld>
-            <a:endParaRPr lang="en-US"/>
+            <a:endParaRPr lang="en-US" dirty="0"/>
           </a:p>
         </p:txBody>
       </p:sp>
@@ -3329,9 +3329,9 @@
           <a:p>
             <a:fld id="{6900ED20-245A-4176-8383-E64D97094D5B}" type="datetimeFigureOut">
               <a:rPr lang="en-US" smtClean="0"/>
-              <a:t>8/17/2023</a:t>
+              <a:t>8/22/2023</a:t>
             </a:fld>
-            <a:endParaRPr lang="en-US"/>
+            <a:endParaRPr lang="en-US" dirty="0"/>
           </a:p>
         </p:txBody>
       </p:sp>
@@ -3356,7 +3356,7 @@
           <a:bodyPr/>
           <a:lstStyle/>
           <a:p>
-            <a:endParaRPr lang="en-US"/>
+            <a:endParaRPr lang="en-US" dirty="0"/>
           </a:p>
         </p:txBody>
       </p:sp>
@@ -3385,7 +3385,7 @@
               <a:rPr lang="en-US" smtClean="0"/>
               <a:t>‹#›</a:t>
             </a:fld>
-            <a:endParaRPr lang="en-US"/>
+            <a:endParaRPr lang="en-US" dirty="0"/>
           </a:p>
         </p:txBody>
       </p:sp>
@@ -3527,9 +3527,9 @@
           <a:p>
             <a:fld id="{6900ED20-245A-4176-8383-E64D97094D5B}" type="datetimeFigureOut">
               <a:rPr lang="en-US" smtClean="0"/>
-              <a:t>8/17/2023</a:t>
+              <a:t>8/22/2023</a:t>
             </a:fld>
-            <a:endParaRPr lang="en-US"/>
+            <a:endParaRPr lang="en-US" dirty="0"/>
           </a:p>
         </p:txBody>
       </p:sp>
@@ -3554,7 +3554,7 @@
           <a:bodyPr/>
           <a:lstStyle/>
           <a:p>
-            <a:endParaRPr lang="en-US"/>
+            <a:endParaRPr lang="en-US" dirty="0"/>
           </a:p>
         </p:txBody>
       </p:sp>
@@ -3583,7 +3583,7 @@
               <a:rPr lang="en-US" smtClean="0"/>
               <a:t>‹#›</a:t>
             </a:fld>
-            <a:endParaRPr lang="en-US"/>
+            <a:endParaRPr lang="en-US" dirty="0"/>
           </a:p>
         </p:txBody>
       </p:sp>
@@ -3735,9 +3735,9 @@
           <a:p>
             <a:fld id="{6900ED20-245A-4176-8383-E64D97094D5B}" type="datetimeFigureOut">
               <a:rPr lang="en-US" smtClean="0"/>
-              <a:t>8/17/2023</a:t>
+              <a:t>8/22/2023</a:t>
             </a:fld>
-            <a:endParaRPr lang="en-US"/>
+            <a:endParaRPr lang="en-US" dirty="0"/>
           </a:p>
         </p:txBody>
       </p:sp>
@@ -3762,7 +3762,7 @@
           <a:bodyPr/>
           <a:lstStyle/>
           <a:p>
-            <a:endParaRPr lang="en-US"/>
+            <a:endParaRPr lang="en-US" dirty="0"/>
           </a:p>
         </p:txBody>
       </p:sp>
@@ -3791,7 +3791,7 @@
               <a:rPr lang="en-US" smtClean="0"/>
               <a:t>‹#›</a:t>
             </a:fld>
-            <a:endParaRPr lang="en-US"/>
+            <a:endParaRPr lang="en-US" dirty="0"/>
           </a:p>
         </p:txBody>
       </p:sp>
@@ -3933,9 +3933,9 @@
           <a:p>
             <a:fld id="{6900ED20-245A-4176-8383-E64D97094D5B}" type="datetimeFigureOut">
               <a:rPr lang="en-US" smtClean="0"/>
-              <a:t>8/17/2023</a:t>
+              <a:t>8/22/2023</a:t>
             </a:fld>
-            <a:endParaRPr lang="en-US"/>
+            <a:endParaRPr lang="en-US" dirty="0"/>
           </a:p>
         </p:txBody>
       </p:sp>
@@ -3960,7 +3960,7 @@
           <a:bodyPr/>
           <a:lstStyle/>
           <a:p>
-            <a:endParaRPr lang="en-US"/>
+            <a:endParaRPr lang="en-US" dirty="0"/>
           </a:p>
         </p:txBody>
       </p:sp>
@@ -3989,7 +3989,7 @@
               <a:rPr lang="en-US" smtClean="0"/>
               <a:t>‹#›</a:t>
             </a:fld>
-            <a:endParaRPr lang="en-US"/>
+            <a:endParaRPr lang="en-US" dirty="0"/>
           </a:p>
         </p:txBody>
       </p:sp>
@@ -4208,9 +4208,9 @@
           <a:p>
             <a:fld id="{6900ED20-245A-4176-8383-E64D97094D5B}" type="datetimeFigureOut">
               <a:rPr lang="en-US" smtClean="0"/>
-              <a:t>8/17/2023</a:t>
+              <a:t>8/22/2023</a:t>
             </a:fld>
-            <a:endParaRPr lang="en-US"/>
+            <a:endParaRPr lang="en-US" dirty="0"/>
           </a:p>
         </p:txBody>
       </p:sp>
@@ -4235,7 +4235,7 @@
           <a:bodyPr/>
           <a:lstStyle/>
           <a:p>
-            <a:endParaRPr lang="en-US"/>
+            <a:endParaRPr lang="en-US" dirty="0"/>
           </a:p>
         </p:txBody>
       </p:sp>
@@ -4264,7 +4264,7 @@
               <a:rPr lang="en-US" smtClean="0"/>
               <a:t>‹#›</a:t>
             </a:fld>
-            <a:endParaRPr lang="en-US"/>
+            <a:endParaRPr lang="en-US" dirty="0"/>
           </a:p>
         </p:txBody>
       </p:sp>
@@ -4473,9 +4473,9 @@
           <a:p>
             <a:fld id="{6900ED20-245A-4176-8383-E64D97094D5B}" type="datetimeFigureOut">
               <a:rPr lang="en-US" smtClean="0"/>
-              <a:t>8/17/2023</a:t>
+              <a:t>8/22/2023</a:t>
             </a:fld>
-            <a:endParaRPr lang="en-US"/>
+            <a:endParaRPr lang="en-US" dirty="0"/>
           </a:p>
         </p:txBody>
       </p:sp>
@@ -4500,7 +4500,7 @@
           <a:bodyPr/>
           <a:lstStyle/>
           <a:p>
-            <a:endParaRPr lang="en-US"/>
+            <a:endParaRPr lang="en-US" dirty="0"/>
           </a:p>
         </p:txBody>
       </p:sp>
@@ -4529,7 +4529,7 @@
               <a:rPr lang="en-US" smtClean="0"/>
               <a:t>‹#›</a:t>
             </a:fld>
-            <a:endParaRPr lang="en-US"/>
+            <a:endParaRPr lang="en-US" dirty="0"/>
           </a:p>
         </p:txBody>
       </p:sp>
@@ -4885,9 +4885,9 @@
           <a:p>
             <a:fld id="{6900ED20-245A-4176-8383-E64D97094D5B}" type="datetimeFigureOut">
               <a:rPr lang="en-US" smtClean="0"/>
-              <a:t>8/17/2023</a:t>
+              <a:t>8/22/2023</a:t>
             </a:fld>
-            <a:endParaRPr lang="en-US"/>
+            <a:endParaRPr lang="en-US" dirty="0"/>
           </a:p>
         </p:txBody>
       </p:sp>
@@ -4912,7 +4912,7 @@
           <a:bodyPr/>
           <a:lstStyle/>
           <a:p>
-            <a:endParaRPr lang="en-US"/>
+            <a:endParaRPr lang="en-US" dirty="0"/>
           </a:p>
         </p:txBody>
       </p:sp>
@@ -4941,7 +4941,7 @@
               <a:rPr lang="en-US" smtClean="0"/>
               <a:t>‹#›</a:t>
             </a:fld>
-            <a:endParaRPr lang="en-US"/>
+            <a:endParaRPr lang="en-US" dirty="0"/>
           </a:p>
         </p:txBody>
       </p:sp>
@@ -5026,9 +5026,9 @@
           <a:p>
             <a:fld id="{6900ED20-245A-4176-8383-E64D97094D5B}" type="datetimeFigureOut">
               <a:rPr lang="en-US" smtClean="0"/>
-              <a:t>8/17/2023</a:t>
+              <a:t>8/22/2023</a:t>
             </a:fld>
-            <a:endParaRPr lang="en-US"/>
+            <a:endParaRPr lang="en-US" dirty="0"/>
           </a:p>
         </p:txBody>
       </p:sp>
@@ -5053,7 +5053,7 @@
           <a:bodyPr/>
           <a:lstStyle/>
           <a:p>
-            <a:endParaRPr lang="en-US"/>
+            <a:endParaRPr lang="en-US" dirty="0"/>
           </a:p>
         </p:txBody>
       </p:sp>
@@ -5082,7 +5082,7 @@
               <a:rPr lang="en-US" smtClean="0"/>
               <a:t>‹#›</a:t>
             </a:fld>
-            <a:endParaRPr lang="en-US"/>
+            <a:endParaRPr lang="en-US" dirty="0"/>
           </a:p>
         </p:txBody>
       </p:sp>
@@ -5139,9 +5139,9 @@
           <a:p>
             <a:fld id="{6900ED20-245A-4176-8383-E64D97094D5B}" type="datetimeFigureOut">
               <a:rPr lang="en-US" smtClean="0"/>
-              <a:t>8/17/2023</a:t>
+              <a:t>8/22/2023</a:t>
             </a:fld>
-            <a:endParaRPr lang="en-US"/>
+            <a:endParaRPr lang="en-US" dirty="0"/>
           </a:p>
         </p:txBody>
       </p:sp>
@@ -5166,7 +5166,7 @@
           <a:bodyPr/>
           <a:lstStyle/>
           <a:p>
-            <a:endParaRPr lang="en-US"/>
+            <a:endParaRPr lang="en-US" dirty="0"/>
           </a:p>
         </p:txBody>
       </p:sp>
@@ -5195,7 +5195,7 @@
               <a:rPr lang="en-US" smtClean="0"/>
               <a:t>‹#›</a:t>
             </a:fld>
-            <a:endParaRPr lang="en-US"/>
+            <a:endParaRPr lang="en-US" dirty="0"/>
           </a:p>
         </p:txBody>
       </p:sp>
@@ -5450,9 +5450,9 @@
           <a:p>
             <a:fld id="{6900ED20-245A-4176-8383-E64D97094D5B}" type="datetimeFigureOut">
               <a:rPr lang="en-US" smtClean="0"/>
-              <a:t>8/17/2023</a:t>
+              <a:t>8/22/2023</a:t>
             </a:fld>
-            <a:endParaRPr lang="en-US"/>
+            <a:endParaRPr lang="en-US" dirty="0"/>
           </a:p>
         </p:txBody>
       </p:sp>
@@ -5477,7 +5477,7 @@
           <a:bodyPr/>
           <a:lstStyle/>
           <a:p>
-            <a:endParaRPr lang="en-US"/>
+            <a:endParaRPr lang="en-US" dirty="0"/>
           </a:p>
         </p:txBody>
       </p:sp>
@@ -5506,7 +5506,7 @@
               <a:rPr lang="en-US" smtClean="0"/>
               <a:t>‹#›</a:t>
             </a:fld>
-            <a:endParaRPr lang="en-US"/>
+            <a:endParaRPr lang="en-US" dirty="0"/>
           </a:p>
         </p:txBody>
       </p:sp>
@@ -5640,7 +5640,7 @@
             </a:lvl9pPr>
           </a:lstStyle>
           <a:p>
-            <a:endParaRPr lang="en-US"/>
+            <a:endParaRPr lang="en-US" dirty="0"/>
           </a:p>
         </p:txBody>
       </p:sp>
@@ -5738,9 +5738,9 @@
           <a:p>
             <a:fld id="{6900ED20-245A-4176-8383-E64D97094D5B}" type="datetimeFigureOut">
               <a:rPr lang="en-US" smtClean="0"/>
-              <a:t>8/17/2023</a:t>
+              <a:t>8/22/2023</a:t>
             </a:fld>
-            <a:endParaRPr lang="en-US"/>
+            <a:endParaRPr lang="en-US" dirty="0"/>
           </a:p>
         </p:txBody>
       </p:sp>
@@ -5765,7 +5765,7 @@
           <a:bodyPr/>
           <a:lstStyle/>
           <a:p>
-            <a:endParaRPr lang="en-US"/>
+            <a:endParaRPr lang="en-US" dirty="0"/>
           </a:p>
         </p:txBody>
       </p:sp>
@@ -5794,7 +5794,7 @@
               <a:rPr lang="en-US" smtClean="0"/>
               <a:t>‹#›</a:t>
             </a:fld>
-            <a:endParaRPr lang="en-US"/>
+            <a:endParaRPr lang="en-US" dirty="0"/>
           </a:p>
         </p:txBody>
       </p:sp>
@@ -5979,9 +5979,9 @@
           <a:p>
             <a:fld id="{6900ED20-245A-4176-8383-E64D97094D5B}" type="datetimeFigureOut">
               <a:rPr lang="en-US" smtClean="0"/>
-              <a:t>8/17/2023</a:t>
+              <a:t>8/22/2023</a:t>
             </a:fld>
-            <a:endParaRPr lang="en-US"/>
+            <a:endParaRPr lang="en-US" dirty="0"/>
           </a:p>
         </p:txBody>
       </p:sp>
@@ -6024,7 +6024,7 @@
             </a:lvl1pPr>
           </a:lstStyle>
           <a:p>
-            <a:endParaRPr lang="en-US"/>
+            <a:endParaRPr lang="en-US" dirty="0"/>
           </a:p>
         </p:txBody>
       </p:sp>
@@ -6071,7 +6071,7 @@
               <a:rPr lang="en-US" smtClean="0"/>
               <a:t>‹#›</a:t>
             </a:fld>
-            <a:endParaRPr lang="en-US"/>
+            <a:endParaRPr lang="en-US" dirty="0"/>
           </a:p>
         </p:txBody>
       </p:sp>
@@ -6486,15 +6486,7 @@
             </a:pPr>
             <a:r>
               <a:rPr lang="en-US" sz="1600" b="1" spc="300" dirty="0"/>
-              <a:t>Cesar Martinez, Dalton Chenoweth, Reagan </a:t>
-            </a:r>
-            <a:r>
-              <a:rPr lang="en-US" sz="1600" b="1" spc="300" dirty="0" err="1"/>
-              <a:t>Bennos</a:t>
-            </a:r>
-            <a:r>
-              <a:rPr lang="en-US" sz="1600" b="1" spc="300" dirty="0"/>
-              <a:t>, and Steve Desilets</a:t>
+              <a:t>Cesar Martinez, Dalton Chenoweth, Reagan Bennos, and Steve Desilets</a:t>
             </a:r>
           </a:p>
         </p:txBody>
@@ -12668,15 +12660,7 @@
             </a:pPr>
             <a:r>
               <a:rPr lang="en-US" sz="1200" dirty="0"/>
-              <a:t>Our team generated and reviewed a sensitivity report for this linear programming problem using GLPK and </a:t>
-            </a:r>
-            <a:r>
-              <a:rPr lang="en-US" sz="1200" dirty="0" err="1"/>
-              <a:t>Gurobi</a:t>
-            </a:r>
-            <a:r>
-              <a:rPr lang="en-US" sz="1200" dirty="0"/>
-              <a:t> in Python. The sensitivity report contained information regarding the 370 constraints and the 57 variables. Below, we summarize key findings from our review of this sensitivity report.</a:t>
+              <a:t>Our team generated and reviewed a sensitivity report for this linear programming problem using GLPK and Gurobi in Python. The sensitivity report contained information regarding the 370 constraints and the 57 variables. Below, we summarize key findings from our review of this sensitivity report.</a:t>
             </a:r>
           </a:p>
         </p:txBody>
@@ -13008,7 +12992,7 @@
         <p:spPr>
           <a:xfrm>
             <a:off x="815340" y="3315832"/>
-            <a:ext cx="3419856" cy="3535263"/>
+            <a:ext cx="3419856" cy="3150542"/>
           </a:xfrm>
           <a:prstGeom prst="rect">
             <a:avLst/>
@@ -13061,9 +13045,6 @@
               <a:lnSpc>
                 <a:spcPct val="130000"/>
               </a:lnSpc>
-              <a:spcBef>
-                <a:spcPts val="1000"/>
-              </a:spcBef>
               <a:spcAft>
                 <a:spcPts val="0"/>
               </a:spcAft>
@@ -13089,9 +13070,6 @@
               <a:lnSpc>
                 <a:spcPct val="130000"/>
               </a:lnSpc>
-              <a:spcBef>
-                <a:spcPts val="1000"/>
-              </a:spcBef>
               <a:spcAft>
                 <a:spcPts val="0"/>
               </a:spcAft>
@@ -13126,7 +13104,7 @@
                 </a:solidFill>
                 <a:latin typeface="Calibri" panose="020F0502020204030204"/>
               </a:rPr>
-              <a:t> linear programming dual problem</a:t>
+              <a:t> integer programming dual problem</a:t>
             </a:r>
           </a:p>
           <a:p>
@@ -13134,9 +13112,6 @@
               <a:lnSpc>
                 <a:spcPct val="130000"/>
               </a:lnSpc>
-              <a:spcBef>
-                <a:spcPts val="1000"/>
-              </a:spcBef>
               <a:spcAft>
                 <a:spcPts val="0"/>
               </a:spcAft>
@@ -13162,7 +13137,7 @@
                 <a:ea typeface="+mn-ea"/>
                 <a:cs typeface="+mn-cs"/>
               </a:rPr>
-              <a:t>Optimizing the linear programming problem in another</a:t>
+              <a:t>Optimizing the integer programming problem in another</a:t>
             </a:r>
             <a:r>
               <a:rPr lang="en-US" sz="1400" dirty="0">
@@ -13436,7 +13411,7 @@
                 </a:solidFill>
                 <a:latin typeface="Calibri" panose="020F0502020204030204"/>
               </a:rPr>
-              <a:t>If the brewing company were ever interested in expanding its business by adding new breweries, types of beer, commodities, or packaging units, then researchers could modify this initial linear programming model to reflect how the company could optimally minimize transportation and distribution costs after that business expansion.</a:t>
+              <a:t>If the brewing company were ever interested in expanding its business by adding new breweries, types of beer, commodities, or packaging units, then researchers could modify this initial integer programming model to reflect how the company could optimally minimize transportation and distribution costs after that business expansion.</a:t>
             </a:r>
             <a:endParaRPr kumimoji="0" lang="en-US" sz="1400" b="0" i="0" u="none" strike="noStrike" kern="1200" cap="none" spc="0" normalizeH="0" baseline="0" noProof="0" dirty="0">
               <a:ln>
@@ -13701,7 +13676,7 @@
                 </a:solidFill>
                 <a:latin typeface="Calibri" panose="020F0502020204030204"/>
               </a:rPr>
-              <a:t>Data scientists could expand the linear programming model to reflect a more holistic view of the brewing company’s finances. Instead of solely including transportation and distribution costs, researchers could add features to the model, like profit, revenue, or additional costs (i.e. marketing, labor, and fixed costs).</a:t>
+              <a:t>Data scientists could expand the integer  programming model to reflect a more holistic view of the brewing company’s finances. Instead of solely including transportation and distribution costs, researchers could add features to the model, like profit, revenue, or additional costs (i.e. marketing, labor, and fixed costs).</a:t>
             </a:r>
             <a:endParaRPr kumimoji="0" lang="en-US" sz="1400" b="0" i="0" u="none" strike="noStrike" kern="1200" cap="none" spc="0" normalizeH="0" baseline="0" noProof="0" dirty="0">
               <a:ln>
@@ -13980,18 +13955,6 @@
           <a:p>
             <a:pPr marL="457200" indent="-457200"/>
             <a:r>
-              <a:rPr lang="en-US" sz="2400" b="0" i="0" u="none" strike="noStrike" dirty="0" err="1">
-                <a:solidFill>
-                  <a:srgbClr val="000000"/>
-                </a:solidFill>
-                <a:effectLst/>
-                <a:latin typeface="Calibri" panose="020F0502020204030204" pitchFamily="34" charset="0"/>
-                <a:ea typeface="Calibri" panose="020F0502020204030204" pitchFamily="34" charset="0"/>
-                <a:cs typeface="Calibri" panose="020F0502020204030204" pitchFamily="34" charset="0"/>
-              </a:rPr>
-              <a:t>Kallrath</a:t>
-            </a:r>
-            <a:r>
               <a:rPr lang="en-US" sz="2400" b="0" i="0" u="none" strike="noStrike" dirty="0">
                 <a:solidFill>
                   <a:srgbClr val="000000"/>
@@ -14001,7 +13964,7 @@
                 <a:ea typeface="Calibri" panose="020F0502020204030204" pitchFamily="34" charset="0"/>
                 <a:cs typeface="Calibri" panose="020F0502020204030204" pitchFamily="34" charset="0"/>
               </a:rPr>
-              <a:t>, Josef. 2021. </a:t>
+              <a:t>Kallrath, Josef. 2021. </a:t>
             </a:r>
             <a:r>
               <a:rPr lang="en-US" sz="2400" b="0" i="1" u="none" strike="noStrike" dirty="0">
@@ -15539,15 +15502,7 @@
             </a:pPr>
             <a:r>
               <a:rPr lang="en-US" sz="1200" dirty="0"/>
-              <a:t>The problem we chose to solve is presented in chapter 8.3 of “Business Optimization Using Mathematical Programming” (</a:t>
-            </a:r>
-            <a:r>
-              <a:rPr lang="en-US" sz="1200" dirty="0" err="1"/>
-              <a:t>Kallrath</a:t>
-            </a:r>
-            <a:r>
-              <a:rPr lang="en-US" sz="1200" dirty="0"/>
-              <a:t> 2021).</a:t>
+              <a:t>The problem we chose to solve is presented in chapter 8.3 of “Business Optimization Using Mathematical Programming” (Kallrath 2021).</a:t>
             </a:r>
           </a:p>
         </p:txBody>
@@ -16021,7 +15976,7 @@
                 </a:solidFill>
                 <a:latin typeface="Calibri" panose="020F0502020204030204"/>
               </a:rPr>
-              <a:t>There company produces 20 commodities, which are unique combinations of beer and container types</a:t>
+              <a:t>The company produces 20 commodities, which are unique combinations of beer and container types</a:t>
             </a:r>
           </a:p>
           <a:p>
@@ -16128,7 +16083,7 @@
         <p:spPr>
           <a:xfrm>
             <a:off x="6313932" y="2663369"/>
-            <a:ext cx="2468880" cy="2369880"/>
+            <a:ext cx="2468880" cy="2062103"/>
           </a:xfrm>
           <a:prstGeom prst="rect">
             <a:avLst/>
@@ -16242,7 +16197,7 @@
                 <a:ea typeface="+mn-ea"/>
                 <a:cs typeface="+mn-cs"/>
               </a:rPr>
-              <a:t>The objective function that we minimize calculates the sum of the liquid transportation costs from each brewery to each packaging unit plus the sum of the commodity transportation costs from each packaging unit to each demand point.</a:t>
+              <a:t>The objective function that we minimize calculates the sum of the liquid transportation costs from each brewery to each packaging unit plus the sum of the commodity distribution costs from each packaging unit to each demand point.</a:t>
             </a:r>
           </a:p>
         </p:txBody>
@@ -16419,24 +16374,7 @@
                 <a:ea typeface="+mn-ea"/>
                 <a:cs typeface="+mn-cs"/>
               </a:rPr>
-              <a:t>This </a:t>
-            </a:r>
-            <a:r>
-              <a:rPr kumimoji="0" lang="en-US" sz="1200" b="0" i="0" u="none" strike="noStrike" kern="1200" cap="none" spc="0" normalizeH="0" baseline="0" noProof="0" dirty="0" err="1">
-                <a:ln>
-                  <a:noFill/>
-                </a:ln>
-                <a:solidFill>
-                  <a:srgbClr val="000000"/>
-                </a:solidFill>
-                <a:effectLst/>
-                <a:uLnTx/>
-                <a:uFillTx/>
-                <a:latin typeface="Calibri" panose="020F0502020204030204"/>
-                <a:ea typeface="+mn-ea"/>
-                <a:cs typeface="+mn-cs"/>
-              </a:rPr>
-              <a:t>proble</a:t>
+              <a:t>This proble</a:t>
             </a:r>
             <a:r>
               <a:rPr lang="en-US" sz="1200" dirty="0">
@@ -16537,7 +16475,7 @@
                 </a:solidFill>
                 <a:latin typeface="Calibri" panose="020F0502020204030204"/>
               </a:rPr>
-              <a:t>Each brewery has maximum beer / ale / total brewing capacities</a:t>
+              <a:t>Each brewery has maximum lager / ale / total brewing capacities</a:t>
             </a:r>
           </a:p>
           <a:p>
@@ -16637,41 +16575,8 @@
                 <a:ea typeface="+mn-ea"/>
                 <a:cs typeface="+mn-cs"/>
               </a:rPr>
-              <a:t>Demand for each commodity at each demand point must be met</a:t>
+              <a:t>We want to try to meet the demand for each commodity at each demand point</a:t>
             </a:r>
-          </a:p>
-          <a:p>
-            <a:pPr marL="171450" marR="0" lvl="0" indent="-171450" algn="l" defTabSz="914400" rtl="0" eaLnBrk="1" fontAlgn="auto" latinLnBrk="0" hangingPunct="1">
-              <a:lnSpc>
-                <a:spcPct val="100000"/>
-              </a:lnSpc>
-              <a:spcBef>
-                <a:spcPts val="0"/>
-              </a:spcBef>
-              <a:spcAft>
-                <a:spcPts val="0"/>
-              </a:spcAft>
-              <a:buClrTx/>
-              <a:buSzTx/>
-              <a:buFont typeface="Arial" panose="020B0604020202020204" pitchFamily="34" charset="0"/>
-              <a:buChar char="•"/>
-              <a:tabLst/>
-              <a:defRPr/>
-            </a:pPr>
-            <a:endParaRPr kumimoji="0" lang="en-US" sz="1200" b="0" i="0" u="none" strike="noStrike" kern="1200" cap="none" spc="0" normalizeH="0" baseline="0" noProof="0" dirty="0">
-              <a:ln>
-                <a:noFill/>
-              </a:ln>
-              <a:solidFill>
-                <a:srgbClr val="000000"/>
-              </a:solidFill>
-              <a:effectLst/>
-              <a:uLnTx/>
-              <a:uFillTx/>
-              <a:latin typeface="Calibri" panose="020F0502020204030204"/>
-              <a:ea typeface="+mn-ea"/>
-              <a:cs typeface="+mn-cs"/>
-            </a:endParaRPr>
           </a:p>
         </p:txBody>
       </p:sp>
@@ -17378,7 +17283,7 @@
               <a:tabLst/>
               <a:defRPr/>
             </a:pPr>
-            <a:endParaRPr kumimoji="0" lang="en-US" sz="1800" b="0" i="0" u="none" strike="noStrike" kern="1200" cap="none" spc="0" normalizeH="0" baseline="0" noProof="0">
+            <a:endParaRPr kumimoji="0" lang="en-US" sz="1800" b="0" i="0" u="none" strike="noStrike" kern="1200" cap="none" spc="0" normalizeH="0" baseline="0" noProof="0" dirty="0">
               <a:ln>
                 <a:noFill/>
               </a:ln>
@@ -18116,7 +18021,7 @@
                 <a:ea typeface="+mn-ea"/>
                 <a:cs typeface="+mn-cs"/>
               </a:rPr>
-              <a:t>, we were able to formulate the problem by defining its variables, objective function, and constraints, which we describe below</a:t>
+              <a:t>, we were able to formulate the problem by defining its variables, objective function, and constraints, which we describe below.</a:t>
             </a:r>
             <a:endParaRPr lang="en-US" sz="1200" dirty="0">
               <a:latin typeface="+mn-lt"/>
@@ -18511,19 +18416,7 @@
                   <a:rPr lang="en-US" sz="1200" dirty="0">
                     <a:latin typeface="+mn-lt"/>
                   </a:rPr>
-                  <a:t>Represents the amount of beer shipped from brewery '</a:t>
-                </a:r>
-                <a:r>
-                  <a:rPr lang="en-US" sz="1200" dirty="0" err="1">
-                    <a:latin typeface="+mn-lt"/>
-                  </a:rPr>
-                  <a:t>i</a:t>
-                </a:r>
-                <a:r>
-                  <a:rPr lang="en-US" sz="1200" dirty="0">
-                    <a:latin typeface="+mn-lt"/>
-                  </a:rPr>
-                  <a:t>' to packaging facility 'j'.</a:t>
+                  <a:t>Represents the amount of beer shipped from brewery 'i' to packaging facility 'j'.</a:t>
                 </a:r>
               </a:p>
               <a:p>
@@ -19039,25 +18932,7 @@
                 <a:ea typeface="Calibri" panose="020F0502020204030204" pitchFamily="34" charset="0"/>
                 <a:cs typeface="Times New Roman" panose="02020603050405020304" pitchFamily="18" charset="0"/>
               </a:rPr>
-              <a:t>Total Transportation Costs = ∑(</a:t>
-            </a:r>
-            <a:r>
-              <a:rPr lang="en-US" sz="1200" kern="100" dirty="0" err="1">
-                <a:effectLst/>
-                <a:latin typeface="Calibri" panose="020F0502020204030204" pitchFamily="34" charset="0"/>
-                <a:ea typeface="Calibri" panose="020F0502020204030204" pitchFamily="34" charset="0"/>
-                <a:cs typeface="Times New Roman" panose="02020603050405020304" pitchFamily="18" charset="0"/>
-              </a:rPr>
-              <a:t>i</a:t>
-            </a:r>
-            <a:r>
-              <a:rPr lang="en-US" sz="1200" kern="100" dirty="0">
-                <a:effectLst/>
-                <a:latin typeface="Calibri" panose="020F0502020204030204" pitchFamily="34" charset="0"/>
-                <a:ea typeface="Calibri" panose="020F0502020204030204" pitchFamily="34" charset="0"/>
-                <a:cs typeface="Times New Roman" panose="02020603050405020304" pitchFamily="18" charset="0"/>
-              </a:rPr>
-              <a:t> </a:t>
+              <a:t>Total Transportation Costs = ∑(i </a:t>
             </a:r>
             <a:r>
               <a:rPr lang="en-US" sz="1200" kern="100" dirty="0">
@@ -19111,25 +18986,7 @@
                 <a:ea typeface="Calibri" panose="020F0502020204030204" pitchFamily="34" charset="0"/>
                 <a:cs typeface="Times New Roman" panose="02020603050405020304" pitchFamily="18" charset="0"/>
               </a:rPr>
-              <a:t> packaging) inputs_1[</a:t>
-            </a:r>
-            <a:r>
-              <a:rPr lang="en-US" sz="1200" kern="100" dirty="0" err="1">
-                <a:effectLst/>
-                <a:latin typeface="Calibri" panose="020F0502020204030204" pitchFamily="34" charset="0"/>
-                <a:ea typeface="Calibri" panose="020F0502020204030204" pitchFamily="34" charset="0"/>
-                <a:cs typeface="Times New Roman" panose="02020603050405020304" pitchFamily="18" charset="0"/>
-              </a:rPr>
-              <a:t>i</a:t>
-            </a:r>
-            <a:r>
-              <a:rPr lang="en-US" sz="1200" kern="100" dirty="0">
-                <a:effectLst/>
-                <a:latin typeface="Calibri" panose="020F0502020204030204" pitchFamily="34" charset="0"/>
-                <a:ea typeface="Calibri" panose="020F0502020204030204" pitchFamily="34" charset="0"/>
-                <a:cs typeface="Times New Roman" panose="02020603050405020304" pitchFamily="18" charset="0"/>
-              </a:rPr>
-              <a:t>][j] </a:t>
+              <a:t> packaging) inputs_1[i][j] </a:t>
             </a:r>
             <a:r>
               <a:rPr lang="en-US" sz="1200" kern="100" dirty="0">
@@ -19147,43 +19004,7 @@
                 <a:ea typeface="Calibri" panose="020F0502020204030204" pitchFamily="34" charset="0"/>
                 <a:cs typeface="Times New Roman" panose="02020603050405020304" pitchFamily="18" charset="0"/>
               </a:rPr>
-              <a:t> </a:t>
-            </a:r>
-            <a:r>
-              <a:rPr lang="en-US" sz="1200" kern="100" dirty="0" err="1">
-                <a:effectLst/>
-                <a:latin typeface="Calibri" panose="020F0502020204030204" pitchFamily="34" charset="0"/>
-                <a:ea typeface="Calibri" panose="020F0502020204030204" pitchFamily="34" charset="0"/>
-                <a:cs typeface="Times New Roman" panose="02020603050405020304" pitchFamily="18" charset="0"/>
-              </a:rPr>
-              <a:t>brew_to_pack_shipping_costs</a:t>
-            </a:r>
-            <a:r>
-              <a:rPr lang="en-US" sz="1200" kern="100" dirty="0">
-                <a:effectLst/>
-                <a:latin typeface="Calibri" panose="020F0502020204030204" pitchFamily="34" charset="0"/>
-                <a:ea typeface="Calibri" panose="020F0502020204030204" pitchFamily="34" charset="0"/>
-                <a:cs typeface="Times New Roman" panose="02020603050405020304" pitchFamily="18" charset="0"/>
-              </a:rPr>
-              <a:t>[</a:t>
-            </a:r>
-            <a:r>
-              <a:rPr lang="en-US" sz="1200" kern="100" dirty="0" err="1">
-                <a:effectLst/>
-                <a:latin typeface="Calibri" panose="020F0502020204030204" pitchFamily="34" charset="0"/>
-                <a:ea typeface="Calibri" panose="020F0502020204030204" pitchFamily="34" charset="0"/>
-                <a:cs typeface="Times New Roman" panose="02020603050405020304" pitchFamily="18" charset="0"/>
-              </a:rPr>
-              <a:t>i</a:t>
-            </a:r>
-            <a:r>
-              <a:rPr lang="en-US" sz="1200" kern="100" dirty="0">
-                <a:effectLst/>
-                <a:latin typeface="Calibri" panose="020F0502020204030204" pitchFamily="34" charset="0"/>
-                <a:ea typeface="Calibri" panose="020F0502020204030204" pitchFamily="34" charset="0"/>
-                <a:cs typeface="Times New Roman" panose="02020603050405020304" pitchFamily="18" charset="0"/>
-              </a:rPr>
-              <a:t>][j]</a:t>
+              <a:t> brew_to_pack_shipping_costs[i][j]</a:t>
             </a:r>
           </a:p>
           <a:p>
@@ -19259,25 +19080,7 @@
                 <a:ea typeface="Calibri" panose="020F0502020204030204" pitchFamily="34" charset="0"/>
                 <a:cs typeface="Times New Roman" panose="02020603050405020304" pitchFamily="18" charset="0"/>
               </a:rPr>
-              <a:t> </a:t>
-            </a:r>
-            <a:r>
-              <a:rPr lang="en-US" sz="1200" kern="100" dirty="0" err="1">
-                <a:effectLst/>
-                <a:latin typeface="Calibri" panose="020F0502020204030204" pitchFamily="34" charset="0"/>
-                <a:ea typeface="Calibri" panose="020F0502020204030204" pitchFamily="34" charset="0"/>
-                <a:cs typeface="Times New Roman" panose="02020603050405020304" pitchFamily="18" charset="0"/>
-              </a:rPr>
-              <a:t>demand_points</a:t>
-            </a:r>
-            <a:r>
-              <a:rPr lang="en-US" sz="1200" kern="100" dirty="0">
-                <a:effectLst/>
-                <a:latin typeface="Calibri" panose="020F0502020204030204" pitchFamily="34" charset="0"/>
-                <a:ea typeface="Calibri" panose="020F0502020204030204" pitchFamily="34" charset="0"/>
-                <a:cs typeface="Times New Roman" panose="02020603050405020304" pitchFamily="18" charset="0"/>
-              </a:rPr>
-              <a:t>) inputs_2[j][k] </a:t>
+              <a:t> demand_points) inputs_2[j][k] </a:t>
             </a:r>
             <a:r>
               <a:rPr lang="en-US" sz="1200" kern="100" dirty="0">
@@ -19295,25 +19098,7 @@
                 <a:ea typeface="Calibri" panose="020F0502020204030204" pitchFamily="34" charset="0"/>
                 <a:cs typeface="Times New Roman" panose="02020603050405020304" pitchFamily="18" charset="0"/>
               </a:rPr>
-              <a:t> </a:t>
-            </a:r>
-            <a:r>
-              <a:rPr lang="en-US" sz="1200" kern="100" dirty="0" err="1">
-                <a:effectLst/>
-                <a:latin typeface="Calibri" panose="020F0502020204030204" pitchFamily="34" charset="0"/>
-                <a:ea typeface="Calibri" panose="020F0502020204030204" pitchFamily="34" charset="0"/>
-                <a:cs typeface="Times New Roman" panose="02020603050405020304" pitchFamily="18" charset="0"/>
-              </a:rPr>
-              <a:t>pack_to_demand_shipping_costs</a:t>
-            </a:r>
-            <a:r>
-              <a:rPr lang="en-US" sz="1200" kern="100" dirty="0">
-                <a:effectLst/>
-                <a:latin typeface="Calibri" panose="020F0502020204030204" pitchFamily="34" charset="0"/>
-                <a:ea typeface="Calibri" panose="020F0502020204030204" pitchFamily="34" charset="0"/>
-                <a:cs typeface="Times New Roman" panose="02020603050405020304" pitchFamily="18" charset="0"/>
-              </a:rPr>
-              <a:t>[container][k][j]</a:t>
+              <a:t> pack_to_demand_shipping_costs[container][k][j]</a:t>
             </a:r>
           </a:p>
         </p:txBody>
@@ -19584,7 +19369,7 @@
         </p:nvSpPr>
         <p:spPr>
           <a:xfrm>
-            <a:off x="3532632" y="1176882"/>
+            <a:off x="3532632" y="1217522"/>
             <a:ext cx="8141208" cy="2429916"/>
           </a:xfrm>
           <a:prstGeom prst="rect">
@@ -19786,7 +19571,7 @@
                 <a:ea typeface="+mj-ea"/>
                 <a:cs typeface="+mj-cs"/>
               </a:rPr>
-              <a:t>The variables must have integer – not fractional – values since the brewing company can only sell whole beers.</a:t>
+              <a:t>The variables must have integer – not fractional – values since the brewing company can only sell whole beers</a:t>
             </a:r>
           </a:p>
           <a:p>
@@ -20039,7 +19824,7 @@
         </p:nvCxnSpPr>
         <p:spPr>
           <a:xfrm>
-            <a:off x="3641598" y="1416401"/>
+            <a:off x="3641598" y="1457041"/>
             <a:ext cx="822960" cy="0"/>
           </a:xfrm>
           <a:prstGeom prst="line">
@@ -20080,7 +19865,7 @@
         </p:nvSpPr>
         <p:spPr>
           <a:xfrm>
-            <a:off x="3195320" y="1176883"/>
+            <a:off x="3195320" y="1217523"/>
             <a:ext cx="274320" cy="274320"/>
           </a:xfrm>
           <a:prstGeom prst="ellipse">
@@ -20579,19 +20364,7 @@
               <a:rPr lang="en-US" sz="1200" dirty="0">
                 <a:latin typeface="+mn-lt"/>
               </a:rPr>
-              <a:t>∑(j ∈ packaging) inputs_2[j][k] ≥ demand[c][k], ∀(c ∈ commodities), ∀(k ∈ </a:t>
-            </a:r>
-            <a:r>
-              <a:rPr lang="en-US" sz="1200" dirty="0" err="1">
-                <a:latin typeface="+mn-lt"/>
-              </a:rPr>
-              <a:t>total_dp_demand.keys</a:t>
-            </a:r>
-            <a:r>
-              <a:rPr lang="en-US" sz="1200" dirty="0">
-                <a:latin typeface="+mn-lt"/>
-              </a:rPr>
-              <a:t>())</a:t>
+              <a:t>∑(j ∈ packaging) inputs_2[j][k] ≥ demand[c][k], ∀(c ∈ commodities), ∀(k ∈ total_dp_demand.keys())</a:t>
             </a:r>
           </a:p>
           <a:p>
@@ -20704,25 +20477,7 @@
                 <a:ea typeface="Calibri" panose="020F0502020204030204" pitchFamily="34" charset="0"/>
                 <a:cs typeface="Times New Roman" panose="02020603050405020304" pitchFamily="18" charset="0"/>
               </a:rPr>
-              <a:t> packaging) inputs_1[</a:t>
-            </a:r>
-            <a:r>
-              <a:rPr lang="en-US" sz="1200" kern="100" dirty="0" err="1">
-                <a:effectLst/>
-                <a:latin typeface="+mn-lt"/>
-                <a:ea typeface="Calibri" panose="020F0502020204030204" pitchFamily="34" charset="0"/>
-                <a:cs typeface="Times New Roman" panose="02020603050405020304" pitchFamily="18" charset="0"/>
-              </a:rPr>
-              <a:t>i</a:t>
-            </a:r>
-            <a:r>
-              <a:rPr lang="en-US" sz="1200" kern="100" dirty="0">
-                <a:effectLst/>
-                <a:latin typeface="+mn-lt"/>
-                <a:ea typeface="Calibri" panose="020F0502020204030204" pitchFamily="34" charset="0"/>
-                <a:cs typeface="Times New Roman" panose="02020603050405020304" pitchFamily="18" charset="0"/>
-              </a:rPr>
-              <a:t>][j] </a:t>
+              <a:t> packaging) inputs_1[i][j] </a:t>
             </a:r>
             <a:r>
               <a:rPr lang="en-US" sz="1200" kern="100" dirty="0">
@@ -20740,43 +20495,7 @@
                 <a:ea typeface="Calibri" panose="020F0502020204030204" pitchFamily="34" charset="0"/>
                 <a:cs typeface="Times New Roman" panose="02020603050405020304" pitchFamily="18" charset="0"/>
               </a:rPr>
-              <a:t> </a:t>
-            </a:r>
-            <a:r>
-              <a:rPr lang="en-US" sz="1200" kern="100" dirty="0" err="1">
-                <a:effectLst/>
-                <a:latin typeface="+mn-lt"/>
-                <a:ea typeface="Calibri" panose="020F0502020204030204" pitchFamily="34" charset="0"/>
-                <a:cs typeface="Times New Roman" panose="02020603050405020304" pitchFamily="18" charset="0"/>
-              </a:rPr>
-              <a:t>brewing_maximum</a:t>
-            </a:r>
-            <a:r>
-              <a:rPr lang="en-US" sz="1200" kern="100" dirty="0">
-                <a:effectLst/>
-                <a:latin typeface="+mn-lt"/>
-                <a:ea typeface="Calibri" panose="020F0502020204030204" pitchFamily="34" charset="0"/>
-                <a:cs typeface="Times New Roman" panose="02020603050405020304" pitchFamily="18" charset="0"/>
-              </a:rPr>
-              <a:t>[</a:t>
-            </a:r>
-            <a:r>
-              <a:rPr lang="en-US" sz="1200" kern="100" dirty="0" err="1">
-                <a:effectLst/>
-                <a:latin typeface="+mn-lt"/>
-                <a:ea typeface="Calibri" panose="020F0502020204030204" pitchFamily="34" charset="0"/>
-                <a:cs typeface="Times New Roman" panose="02020603050405020304" pitchFamily="18" charset="0"/>
-              </a:rPr>
-              <a:t>i</a:t>
-            </a:r>
-            <a:r>
-              <a:rPr lang="en-US" sz="1200" kern="100" dirty="0">
-                <a:effectLst/>
-                <a:latin typeface="+mn-lt"/>
-                <a:ea typeface="Calibri" panose="020F0502020204030204" pitchFamily="34" charset="0"/>
-                <a:cs typeface="Times New Roman" panose="02020603050405020304" pitchFamily="18" charset="0"/>
-              </a:rPr>
-              <a:t>], </a:t>
+              <a:t> brewing_maximum[i], </a:t>
             </a:r>
             <a:r>
               <a:rPr lang="en-US" sz="1200" kern="100" dirty="0">
@@ -20794,25 +20513,7 @@
                 <a:ea typeface="Calibri" panose="020F0502020204030204" pitchFamily="34" charset="0"/>
                 <a:cs typeface="Times New Roman" panose="02020603050405020304" pitchFamily="18" charset="0"/>
               </a:rPr>
-              <a:t>(</a:t>
-            </a:r>
-            <a:r>
-              <a:rPr lang="en-US" sz="1200" kern="100" dirty="0" err="1">
-                <a:effectLst/>
-                <a:latin typeface="+mn-lt"/>
-                <a:ea typeface="Calibri" panose="020F0502020204030204" pitchFamily="34" charset="0"/>
-                <a:cs typeface="Times New Roman" panose="02020603050405020304" pitchFamily="18" charset="0"/>
-              </a:rPr>
-              <a:t>i</a:t>
-            </a:r>
-            <a:r>
-              <a:rPr lang="en-US" sz="1200" kern="100" dirty="0">
-                <a:effectLst/>
-                <a:latin typeface="+mn-lt"/>
-                <a:ea typeface="Calibri" panose="020F0502020204030204" pitchFamily="34" charset="0"/>
-                <a:cs typeface="Times New Roman" panose="02020603050405020304" pitchFamily="18" charset="0"/>
-              </a:rPr>
-              <a:t> </a:t>
+              <a:t>(i </a:t>
             </a:r>
             <a:r>
               <a:rPr lang="en-US" sz="1200" kern="100" dirty="0">
@@ -20946,43 +20647,7 @@
                 <a:ea typeface="Calibri" panose="020F0502020204030204" pitchFamily="34" charset="0"/>
                 <a:cs typeface="Times New Roman" panose="02020603050405020304" pitchFamily="18" charset="0"/>
               </a:rPr>
-              <a:t> </a:t>
-            </a:r>
-            <a:r>
-              <a:rPr lang="en-US" sz="1200" kern="100" dirty="0" err="1">
-                <a:effectLst/>
-                <a:latin typeface="+mn-lt"/>
-                <a:ea typeface="Calibri" panose="020F0502020204030204" pitchFamily="34" charset="0"/>
-                <a:cs typeface="Times New Roman" panose="02020603050405020304" pitchFamily="18" charset="0"/>
-              </a:rPr>
-              <a:t>demand_points</a:t>
-            </a:r>
-            <a:r>
-              <a:rPr lang="en-US" sz="1200" kern="100" dirty="0">
-                <a:effectLst/>
-                <a:latin typeface="+mn-lt"/>
-                <a:ea typeface="Calibri" panose="020F0502020204030204" pitchFamily="34" charset="0"/>
-                <a:cs typeface="Times New Roman" panose="02020603050405020304" pitchFamily="18" charset="0"/>
-              </a:rPr>
-              <a:t>) inputs_2[j][k] ≤ </a:t>
-            </a:r>
-            <a:r>
-              <a:rPr lang="en-US" sz="1200" kern="100" dirty="0" err="1">
-                <a:effectLst/>
-                <a:latin typeface="+mn-lt"/>
-                <a:ea typeface="Calibri" panose="020F0502020204030204" pitchFamily="34" charset="0"/>
-                <a:cs typeface="Times New Roman" panose="02020603050405020304" pitchFamily="18" charset="0"/>
-              </a:rPr>
-              <a:t>packaging_maximum</a:t>
-            </a:r>
-            <a:r>
-              <a:rPr lang="en-US" sz="1200" kern="100" dirty="0">
-                <a:effectLst/>
-                <a:latin typeface="+mn-lt"/>
-                <a:ea typeface="Calibri" panose="020F0502020204030204" pitchFamily="34" charset="0"/>
-                <a:cs typeface="Times New Roman" panose="02020603050405020304" pitchFamily="18" charset="0"/>
-              </a:rPr>
-              <a:t>[j], </a:t>
+              <a:t> demand_points) inputs_2[j][k] ≤ packaging_maximum[j], </a:t>
             </a:r>
             <a:r>
               <a:rPr lang="en-US" sz="1200" kern="100" dirty="0">
@@ -21134,25 +20799,7 @@
                 <a:ea typeface="Calibri" panose="020F0502020204030204" pitchFamily="34" charset="0"/>
                 <a:cs typeface="Times New Roman" panose="02020603050405020304" pitchFamily="18" charset="0"/>
               </a:rPr>
-              <a:t> packaging) inputs_1[</a:t>
-            </a:r>
-            <a:r>
-              <a:rPr lang="en-US" sz="1200" kern="100" dirty="0" err="1">
-                <a:effectLst/>
-                <a:latin typeface="+mn-lt"/>
-                <a:ea typeface="Calibri" panose="020F0502020204030204" pitchFamily="34" charset="0"/>
-                <a:cs typeface="Times New Roman" panose="02020603050405020304" pitchFamily="18" charset="0"/>
-              </a:rPr>
-              <a:t>i</a:t>
-            </a:r>
-            <a:r>
-              <a:rPr lang="en-US" sz="1200" kern="100" dirty="0">
-                <a:effectLst/>
-                <a:latin typeface="+mn-lt"/>
-                <a:ea typeface="Calibri" panose="020F0502020204030204" pitchFamily="34" charset="0"/>
-                <a:cs typeface="Times New Roman" panose="02020603050405020304" pitchFamily="18" charset="0"/>
-              </a:rPr>
-              <a:t>][j] </a:t>
+              <a:t> packaging) inputs_1[i][j] </a:t>
             </a:r>
             <a:r>
               <a:rPr lang="en-US" sz="1200" kern="100" dirty="0">
@@ -21170,43 +20817,7 @@
                 <a:ea typeface="Calibri" panose="020F0502020204030204" pitchFamily="34" charset="0"/>
                 <a:cs typeface="Times New Roman" panose="02020603050405020304" pitchFamily="18" charset="0"/>
               </a:rPr>
-              <a:t> </a:t>
-            </a:r>
-            <a:r>
-              <a:rPr lang="en-US" sz="1200" kern="100" dirty="0" err="1">
-                <a:effectLst/>
-                <a:latin typeface="+mn-lt"/>
-                <a:ea typeface="Calibri" panose="020F0502020204030204" pitchFamily="34" charset="0"/>
-                <a:cs typeface="Times New Roman" panose="02020603050405020304" pitchFamily="18" charset="0"/>
-              </a:rPr>
-              <a:t>brewing_minimum</a:t>
-            </a:r>
-            <a:r>
-              <a:rPr lang="en-US" sz="1200" kern="100" dirty="0">
-                <a:effectLst/>
-                <a:latin typeface="+mn-lt"/>
-                <a:ea typeface="Calibri" panose="020F0502020204030204" pitchFamily="34" charset="0"/>
-                <a:cs typeface="Times New Roman" panose="02020603050405020304" pitchFamily="18" charset="0"/>
-              </a:rPr>
-              <a:t>[</a:t>
-            </a:r>
-            <a:r>
-              <a:rPr lang="en-US" sz="1200" kern="100" dirty="0" err="1">
-                <a:effectLst/>
-                <a:latin typeface="+mn-lt"/>
-                <a:ea typeface="Calibri" panose="020F0502020204030204" pitchFamily="34" charset="0"/>
-                <a:cs typeface="Times New Roman" panose="02020603050405020304" pitchFamily="18" charset="0"/>
-              </a:rPr>
-              <a:t>i</a:t>
-            </a:r>
-            <a:r>
-              <a:rPr lang="en-US" sz="1200" kern="100" dirty="0">
-                <a:effectLst/>
-                <a:latin typeface="+mn-lt"/>
-                <a:ea typeface="Calibri" panose="020F0502020204030204" pitchFamily="34" charset="0"/>
-                <a:cs typeface="Times New Roman" panose="02020603050405020304" pitchFamily="18" charset="0"/>
-              </a:rPr>
-              <a:t>], </a:t>
+              <a:t> brewing_minimum[i], </a:t>
             </a:r>
             <a:r>
               <a:rPr lang="en-US" sz="1200" kern="100" dirty="0">
@@ -21224,25 +20835,7 @@
                 <a:ea typeface="Calibri" panose="020F0502020204030204" pitchFamily="34" charset="0"/>
                 <a:cs typeface="Times New Roman" panose="02020603050405020304" pitchFamily="18" charset="0"/>
               </a:rPr>
-              <a:t>(</a:t>
-            </a:r>
-            <a:r>
-              <a:rPr lang="en-US" sz="1200" kern="100" dirty="0" err="1">
-                <a:effectLst/>
-                <a:latin typeface="+mn-lt"/>
-                <a:ea typeface="Calibri" panose="020F0502020204030204" pitchFamily="34" charset="0"/>
-                <a:cs typeface="Times New Roman" panose="02020603050405020304" pitchFamily="18" charset="0"/>
-              </a:rPr>
-              <a:t>i</a:t>
-            </a:r>
-            <a:r>
-              <a:rPr lang="en-US" sz="1200" kern="100" dirty="0">
-                <a:effectLst/>
-                <a:latin typeface="+mn-lt"/>
-                <a:ea typeface="Calibri" panose="020F0502020204030204" pitchFamily="34" charset="0"/>
-                <a:cs typeface="Times New Roman" panose="02020603050405020304" pitchFamily="18" charset="0"/>
-              </a:rPr>
-              <a:t> </a:t>
+              <a:t>(i </a:t>
             </a:r>
             <a:r>
               <a:rPr lang="en-US" sz="1200" kern="100" dirty="0">
@@ -21376,25 +20969,7 @@
                 <a:ea typeface="Calibri" panose="020F0502020204030204" pitchFamily="34" charset="0"/>
                 <a:cs typeface="Times New Roman" panose="02020603050405020304" pitchFamily="18" charset="0"/>
               </a:rPr>
-              <a:t> </a:t>
-            </a:r>
-            <a:r>
-              <a:rPr lang="en-US" sz="1200" kern="100" dirty="0" err="1">
-                <a:effectLst/>
-                <a:latin typeface="+mn-lt"/>
-                <a:ea typeface="Calibri" panose="020F0502020204030204" pitchFamily="34" charset="0"/>
-                <a:cs typeface="Times New Roman" panose="02020603050405020304" pitchFamily="18" charset="0"/>
-              </a:rPr>
-              <a:t>demand_points</a:t>
-            </a:r>
-            <a:r>
-              <a:rPr lang="en-US" sz="1200" kern="100" dirty="0">
-                <a:effectLst/>
-                <a:latin typeface="+mn-lt"/>
-                <a:ea typeface="Calibri" panose="020F0502020204030204" pitchFamily="34" charset="0"/>
-                <a:cs typeface="Times New Roman" panose="02020603050405020304" pitchFamily="18" charset="0"/>
-              </a:rPr>
-              <a:t>) inputs_2[j][k] </a:t>
+              <a:t> demand_points) inputs_2[j][k] </a:t>
             </a:r>
             <a:r>
               <a:rPr lang="en-US" sz="1200" kern="100" dirty="0">
@@ -21412,25 +20987,7 @@
                 <a:ea typeface="Calibri" panose="020F0502020204030204" pitchFamily="34" charset="0"/>
                 <a:cs typeface="Times New Roman" panose="02020603050405020304" pitchFamily="18" charset="0"/>
               </a:rPr>
-              <a:t> </a:t>
-            </a:r>
-            <a:r>
-              <a:rPr lang="en-US" sz="1200" kern="100" dirty="0" err="1">
-                <a:effectLst/>
-                <a:latin typeface="+mn-lt"/>
-                <a:ea typeface="Calibri" panose="020F0502020204030204" pitchFamily="34" charset="0"/>
-                <a:cs typeface="Times New Roman" panose="02020603050405020304" pitchFamily="18" charset="0"/>
-              </a:rPr>
-              <a:t>packaging_minimum</a:t>
-            </a:r>
-            <a:r>
-              <a:rPr lang="en-US" sz="1200" kern="100" dirty="0">
-                <a:effectLst/>
-                <a:latin typeface="+mn-lt"/>
-                <a:ea typeface="Calibri" panose="020F0502020204030204" pitchFamily="34" charset="0"/>
-                <a:cs typeface="Times New Roman" panose="02020603050405020304" pitchFamily="18" charset="0"/>
-              </a:rPr>
-              <a:t>[j], </a:t>
+              <a:t> packaging_minimum[j], </a:t>
             </a:r>
             <a:r>
               <a:rPr lang="en-US" sz="1200" kern="100" dirty="0">
@@ -21775,39 +21332,8 @@
                 <a:ea typeface="+mn-ea"/>
                 <a:cs typeface="+mn-cs"/>
               </a:rPr>
-              <a:t>Methodology  </a:t>
+              <a:t>Methodology  Part 3</a:t>
             </a:r>
-            <a:r>
-              <a:rPr kumimoji="0" lang="en-US" sz="2800" b="0" i="0" u="none" strike="noStrike" kern="1200" cap="none" spc="0" normalizeH="0" baseline="0" noProof="0">
-                <a:ln>
-                  <a:noFill/>
-                </a:ln>
-                <a:solidFill>
-                  <a:srgbClr val="000000"/>
-                </a:solidFill>
-                <a:effectLst/>
-                <a:uLnTx/>
-                <a:uFillTx/>
-                <a:latin typeface="Calibri" panose="020F0502020204030204"/>
-                <a:ea typeface="+mn-ea"/>
-                <a:cs typeface="+mn-cs"/>
-              </a:rPr>
-              <a:t>Part 3</a:t>
-            </a:r>
-            <a:endParaRPr kumimoji="0" lang="en-US" sz="2800" b="0" i="0" u="none" strike="noStrike" kern="1200" cap="none" spc="0" normalizeH="0" baseline="0" noProof="0" dirty="0">
-              <a:ln>
-                <a:noFill/>
-              </a:ln>
-              <a:solidFill>
-                <a:srgbClr val="000000"/>
-              </a:solidFill>
-              <a:effectLst/>
-              <a:uLnTx/>
-              <a:uFillTx/>
-              <a:latin typeface="Calibri" panose="020F0502020204030204"/>
-              <a:ea typeface="+mn-ea"/>
-              <a:cs typeface="+mn-cs"/>
-            </a:endParaRPr>
           </a:p>
         </p:txBody>
       </p:sp>
@@ -22084,25 +21610,7 @@
                 <a:ea typeface="Calibri" panose="020F0502020204030204" pitchFamily="34" charset="0"/>
                 <a:cs typeface="Times New Roman" panose="02020603050405020304" pitchFamily="18" charset="0"/>
               </a:rPr>
-              <a:t> </a:t>
-            </a:r>
-            <a:r>
-              <a:rPr lang="en-US" sz="1200" kern="100" dirty="0" err="1">
-                <a:effectLst/>
-                <a:latin typeface="Calibri" panose="020F0502020204030204" pitchFamily="34" charset="0"/>
-                <a:ea typeface="Calibri" panose="020F0502020204030204" pitchFamily="34" charset="0"/>
-                <a:cs typeface="Times New Roman" panose="02020603050405020304" pitchFamily="18" charset="0"/>
-              </a:rPr>
-              <a:t>demand_points</a:t>
-            </a:r>
-            <a:r>
-              <a:rPr lang="en-US" sz="1200" kern="100" dirty="0">
-                <a:effectLst/>
-                <a:latin typeface="Calibri" panose="020F0502020204030204" pitchFamily="34" charset="0"/>
-                <a:ea typeface="Calibri" panose="020F0502020204030204" pitchFamily="34" charset="0"/>
-                <a:cs typeface="Times New Roman" panose="02020603050405020304" pitchFamily="18" charset="0"/>
-              </a:rPr>
-              <a:t>) inputs_2[j][k] = </a:t>
+              <a:t> demand_points) inputs_2[j][k] = </a:t>
             </a:r>
             <a:r>
               <a:rPr lang="en-US" sz="1200" kern="100" dirty="0">
@@ -22120,25 +21628,7 @@
                 <a:ea typeface="Calibri" panose="020F0502020204030204" pitchFamily="34" charset="0"/>
                 <a:cs typeface="Times New Roman" panose="02020603050405020304" pitchFamily="18" charset="0"/>
               </a:rPr>
-              <a:t>(</a:t>
-            </a:r>
-            <a:r>
-              <a:rPr lang="en-US" sz="1200" kern="100" dirty="0" err="1">
-                <a:effectLst/>
-                <a:latin typeface="Calibri" panose="020F0502020204030204" pitchFamily="34" charset="0"/>
-                <a:ea typeface="Calibri" panose="020F0502020204030204" pitchFamily="34" charset="0"/>
-                <a:cs typeface="Times New Roman" panose="02020603050405020304" pitchFamily="18" charset="0"/>
-              </a:rPr>
-              <a:t>i</a:t>
-            </a:r>
-            <a:r>
-              <a:rPr lang="en-US" sz="1200" kern="100" dirty="0">
-                <a:effectLst/>
-                <a:latin typeface="Calibri" panose="020F0502020204030204" pitchFamily="34" charset="0"/>
-                <a:ea typeface="Calibri" panose="020F0502020204030204" pitchFamily="34" charset="0"/>
-                <a:cs typeface="Times New Roman" panose="02020603050405020304" pitchFamily="18" charset="0"/>
-              </a:rPr>
-              <a:t> </a:t>
+              <a:t>(i </a:t>
             </a:r>
             <a:r>
               <a:rPr lang="en-US" sz="1200" kern="100" dirty="0">
@@ -22156,25 +21646,7 @@
                 <a:ea typeface="Calibri" panose="020F0502020204030204" pitchFamily="34" charset="0"/>
                 <a:cs typeface="Times New Roman" panose="02020603050405020304" pitchFamily="18" charset="0"/>
               </a:rPr>
-              <a:t> brewing) inputs_1[</a:t>
-            </a:r>
-            <a:r>
-              <a:rPr lang="en-US" sz="1200" kern="100" dirty="0" err="1">
-                <a:effectLst/>
-                <a:latin typeface="Calibri" panose="020F0502020204030204" pitchFamily="34" charset="0"/>
-                <a:ea typeface="Calibri" panose="020F0502020204030204" pitchFamily="34" charset="0"/>
-                <a:cs typeface="Times New Roman" panose="02020603050405020304" pitchFamily="18" charset="0"/>
-              </a:rPr>
-              <a:t>i</a:t>
-            </a:r>
-            <a:r>
-              <a:rPr lang="en-US" sz="1200" kern="100" dirty="0">
-                <a:effectLst/>
-                <a:latin typeface="Calibri" panose="020F0502020204030204" pitchFamily="34" charset="0"/>
-                <a:ea typeface="Calibri" panose="020F0502020204030204" pitchFamily="34" charset="0"/>
-                <a:cs typeface="Times New Roman" panose="02020603050405020304" pitchFamily="18" charset="0"/>
-              </a:rPr>
-              <a:t>][j], </a:t>
+              <a:t> brewing) inputs_1[i][j], </a:t>
             </a:r>
             <a:r>
               <a:rPr lang="en-US" sz="1200" kern="100" dirty="0">
@@ -22341,25 +21813,7 @@
                 <a:ea typeface="Calibri" panose="020F0502020204030204" pitchFamily="34" charset="0"/>
                 <a:cs typeface="Times New Roman" panose="02020603050405020304" pitchFamily="18" charset="0"/>
               </a:rPr>
-              <a:t> packaging) inputs_1[</a:t>
-            </a:r>
-            <a:r>
-              <a:rPr lang="en-US" sz="1200" kern="100" dirty="0" err="1">
-                <a:effectLst/>
-                <a:latin typeface="Calibri" panose="020F0502020204030204" pitchFamily="34" charset="0"/>
-                <a:ea typeface="Calibri" panose="020F0502020204030204" pitchFamily="34" charset="0"/>
-                <a:cs typeface="Times New Roman" panose="02020603050405020304" pitchFamily="18" charset="0"/>
-              </a:rPr>
-              <a:t>i</a:t>
-            </a:r>
-            <a:r>
-              <a:rPr lang="en-US" sz="1200" kern="100" dirty="0">
-                <a:effectLst/>
-                <a:latin typeface="Calibri" panose="020F0502020204030204" pitchFamily="34" charset="0"/>
-                <a:ea typeface="Calibri" panose="020F0502020204030204" pitchFamily="34" charset="0"/>
-                <a:cs typeface="Times New Roman" panose="02020603050405020304" pitchFamily="18" charset="0"/>
-              </a:rPr>
-              <a:t>][j] </a:t>
+              <a:t> packaging) inputs_1[i][j] </a:t>
             </a:r>
             <a:r>
               <a:rPr lang="en-US" sz="1200" kern="100" dirty="0">
@@ -22395,43 +21849,7 @@
                 <a:ea typeface="Calibri" panose="020F0502020204030204" pitchFamily="34" charset="0"/>
                 <a:cs typeface="Times New Roman" panose="02020603050405020304" pitchFamily="18" charset="0"/>
               </a:rPr>
-              <a:t> </a:t>
-            </a:r>
-            <a:r>
-              <a:rPr lang="en-US" sz="1200" kern="100" dirty="0" err="1">
-                <a:effectLst/>
-                <a:latin typeface="Calibri" panose="020F0502020204030204" pitchFamily="34" charset="0"/>
-                <a:ea typeface="Calibri" panose="020F0502020204030204" pitchFamily="34" charset="0"/>
-                <a:cs typeface="Times New Roman" panose="02020603050405020304" pitchFamily="18" charset="0"/>
-              </a:rPr>
-              <a:t>liquid_constraints</a:t>
-            </a:r>
-            <a:r>
-              <a:rPr lang="en-US" sz="1200" kern="100" dirty="0">
-                <a:effectLst/>
-                <a:latin typeface="Calibri" panose="020F0502020204030204" pitchFamily="34" charset="0"/>
-                <a:ea typeface="Calibri" panose="020F0502020204030204" pitchFamily="34" charset="0"/>
-                <a:cs typeface="Times New Roman" panose="02020603050405020304" pitchFamily="18" charset="0"/>
-              </a:rPr>
-              <a:t>[</a:t>
-            </a:r>
-            <a:r>
-              <a:rPr lang="en-US" sz="1200" kern="100" dirty="0" err="1">
-                <a:effectLst/>
-                <a:latin typeface="Calibri" panose="020F0502020204030204" pitchFamily="34" charset="0"/>
-                <a:ea typeface="Calibri" panose="020F0502020204030204" pitchFamily="34" charset="0"/>
-                <a:cs typeface="Times New Roman" panose="02020603050405020304" pitchFamily="18" charset="0"/>
-              </a:rPr>
-              <a:t>required_liquid</a:t>
-            </a:r>
-            <a:r>
-              <a:rPr lang="en-US" sz="1200" kern="100" dirty="0">
-                <a:effectLst/>
-                <a:latin typeface="Calibri" panose="020F0502020204030204" pitchFamily="34" charset="0"/>
-                <a:ea typeface="Calibri" panose="020F0502020204030204" pitchFamily="34" charset="0"/>
-                <a:cs typeface="Times New Roman" panose="02020603050405020304" pitchFamily="18" charset="0"/>
-              </a:rPr>
-              <a:t>]["Max Qty"],</a:t>
+              <a:t> liquid_constraints[required_liquid]["Max Qty"],</a:t>
             </a:r>
           </a:p>
           <a:p>
@@ -22450,61 +21868,7 @@
                 <a:ea typeface="Calibri" panose="020F0502020204030204" pitchFamily="34" charset="0"/>
                 <a:cs typeface="Times New Roman" panose="02020603050405020304" pitchFamily="18" charset="0"/>
               </a:rPr>
-              <a:t>if </a:t>
-            </a:r>
-            <a:r>
-              <a:rPr lang="en-US" sz="1200" kern="100" dirty="0" err="1">
-                <a:effectLst/>
-                <a:latin typeface="Calibri" panose="020F0502020204030204" pitchFamily="34" charset="0"/>
-                <a:ea typeface="Calibri" panose="020F0502020204030204" pitchFamily="34" charset="0"/>
-                <a:cs typeface="Times New Roman" panose="02020603050405020304" pitchFamily="18" charset="0"/>
-              </a:rPr>
-              <a:t>breweries_liquids_config</a:t>
-            </a:r>
-            <a:r>
-              <a:rPr lang="en-US" sz="1200" kern="100" dirty="0">
-                <a:effectLst/>
-                <a:latin typeface="Calibri" panose="020F0502020204030204" pitchFamily="34" charset="0"/>
-                <a:ea typeface="Calibri" panose="020F0502020204030204" pitchFamily="34" charset="0"/>
-                <a:cs typeface="Times New Roman" panose="02020603050405020304" pitchFamily="18" charset="0"/>
-              </a:rPr>
-              <a:t>[</a:t>
-            </a:r>
-            <a:r>
-              <a:rPr lang="en-US" sz="1200" kern="100" dirty="0" err="1">
-                <a:effectLst/>
-                <a:latin typeface="Calibri" panose="020F0502020204030204" pitchFamily="34" charset="0"/>
-                <a:ea typeface="Calibri" panose="020F0502020204030204" pitchFamily="34" charset="0"/>
-                <a:cs typeface="Times New Roman" panose="02020603050405020304" pitchFamily="18" charset="0"/>
-              </a:rPr>
-              <a:t>i</a:t>
-            </a:r>
-            <a:r>
-              <a:rPr lang="en-US" sz="1200" kern="100" dirty="0">
-                <a:effectLst/>
-                <a:latin typeface="Calibri" panose="020F0502020204030204" pitchFamily="34" charset="0"/>
-                <a:ea typeface="Calibri" panose="020F0502020204030204" pitchFamily="34" charset="0"/>
-                <a:cs typeface="Times New Roman" panose="02020603050405020304" pitchFamily="18" charset="0"/>
-              </a:rPr>
-              <a:t>][</a:t>
-            </a:r>
-            <a:r>
-              <a:rPr lang="en-US" sz="1200" kern="100" dirty="0" err="1">
-                <a:effectLst/>
-                <a:latin typeface="Calibri" panose="020F0502020204030204" pitchFamily="34" charset="0"/>
-                <a:ea typeface="Calibri" panose="020F0502020204030204" pitchFamily="34" charset="0"/>
-                <a:cs typeface="Times New Roman" panose="02020603050405020304" pitchFamily="18" charset="0"/>
-              </a:rPr>
-              <a:t>required_liquid</a:t>
-            </a:r>
-            <a:r>
-              <a:rPr lang="en-US" sz="1200" kern="100" dirty="0">
-                <a:effectLst/>
-                <a:latin typeface="Calibri" panose="020F0502020204030204" pitchFamily="34" charset="0"/>
-                <a:ea typeface="Calibri" panose="020F0502020204030204" pitchFamily="34" charset="0"/>
-                <a:cs typeface="Times New Roman" panose="02020603050405020304" pitchFamily="18" charset="0"/>
-              </a:rPr>
-              <a:t>] == 1</a:t>
+              <a:t>if breweries_liquids_config[i][required_liquid] == 1</a:t>
             </a:r>
           </a:p>
           <a:p>
@@ -22635,25 +21999,7 @@
                 <a:ea typeface="Calibri" panose="020F0502020204030204" pitchFamily="34" charset="0"/>
                 <a:cs typeface="Times New Roman" panose="02020603050405020304" pitchFamily="18" charset="0"/>
               </a:rPr>
-              <a:t> </a:t>
-            </a:r>
-            <a:r>
-              <a:rPr lang="en-US" sz="1200" kern="100" dirty="0" err="1">
-                <a:effectLst/>
-                <a:latin typeface="Calibri" panose="020F0502020204030204" pitchFamily="34" charset="0"/>
-                <a:ea typeface="Calibri" panose="020F0502020204030204" pitchFamily="34" charset="0"/>
-                <a:cs typeface="Times New Roman" panose="02020603050405020304" pitchFamily="18" charset="0"/>
-              </a:rPr>
-              <a:t>demand_points</a:t>
-            </a:r>
-            <a:r>
-              <a:rPr lang="en-US" sz="1200" kern="100" dirty="0">
-                <a:effectLst/>
-                <a:latin typeface="Calibri" panose="020F0502020204030204" pitchFamily="34" charset="0"/>
-                <a:ea typeface="Calibri" panose="020F0502020204030204" pitchFamily="34" charset="0"/>
-                <a:cs typeface="Times New Roman" panose="02020603050405020304" pitchFamily="18" charset="0"/>
-              </a:rPr>
-              <a:t>) inputs_2[j][k] </a:t>
+              <a:t> demand_points) inputs_2[j][k] </a:t>
             </a:r>
             <a:r>
               <a:rPr lang="en-US" sz="1200" kern="100" dirty="0">
@@ -22689,43 +22035,7 @@
                 <a:ea typeface="Calibri" panose="020F0502020204030204" pitchFamily="34" charset="0"/>
                 <a:cs typeface="Times New Roman" panose="02020603050405020304" pitchFamily="18" charset="0"/>
               </a:rPr>
-              <a:t> </a:t>
-            </a:r>
-            <a:r>
-              <a:rPr lang="en-US" sz="1200" kern="100" dirty="0" err="1">
-                <a:effectLst/>
-                <a:latin typeface="Calibri" panose="020F0502020204030204" pitchFamily="34" charset="0"/>
-                <a:ea typeface="Calibri" panose="020F0502020204030204" pitchFamily="34" charset="0"/>
-                <a:cs typeface="Times New Roman" panose="02020603050405020304" pitchFamily="18" charset="0"/>
-              </a:rPr>
-              <a:t>container_capacity</a:t>
-            </a:r>
-            <a:r>
-              <a:rPr lang="en-US" sz="1200" kern="100" dirty="0">
-                <a:effectLst/>
-                <a:latin typeface="Calibri" panose="020F0502020204030204" pitchFamily="34" charset="0"/>
-                <a:ea typeface="Calibri" panose="020F0502020204030204" pitchFamily="34" charset="0"/>
-                <a:cs typeface="Times New Roman" panose="02020603050405020304" pitchFamily="18" charset="0"/>
-              </a:rPr>
-              <a:t>[</a:t>
-            </a:r>
-            <a:r>
-              <a:rPr lang="en-US" sz="1200" kern="100" dirty="0" err="1">
-                <a:effectLst/>
-                <a:latin typeface="Calibri" panose="020F0502020204030204" pitchFamily="34" charset="0"/>
-                <a:ea typeface="Calibri" panose="020F0502020204030204" pitchFamily="34" charset="0"/>
-                <a:cs typeface="Times New Roman" panose="02020603050405020304" pitchFamily="18" charset="0"/>
-              </a:rPr>
-              <a:t>required_container</a:t>
-            </a:r>
-            <a:r>
-              <a:rPr lang="en-US" sz="1200" kern="100" dirty="0">
-                <a:effectLst/>
-                <a:latin typeface="Calibri" panose="020F0502020204030204" pitchFamily="34" charset="0"/>
-                <a:ea typeface="Calibri" panose="020F0502020204030204" pitchFamily="34" charset="0"/>
-                <a:cs typeface="Times New Roman" panose="02020603050405020304" pitchFamily="18" charset="0"/>
-              </a:rPr>
-              <a:t>]["Max Qty"],</a:t>
+              <a:t> container_capacity[required_container]["Max Qty"],</a:t>
             </a:r>
           </a:p>
           <a:p>

</xml_diff>

<commit_message>
made slight adjustments to powerpoint
made light adjustments to the powerpoint
</commit_message>
<xml_diff>
--- a/Final Project Presentation.pptx
+++ b/Final Project Presentation.pptx
@@ -140,7 +140,7 @@
   <pc:docChgLst>
     <pc:chgData name="Stephen Desilets" userId="2df8f4c56c849a7f" providerId="LiveId" clId="{B48F43DB-3888-4FF6-B9C2-531E0ECC3ED3}"/>
     <pc:docChg chg="undo custSel addSld delSld modSld delMainMaster">
-      <pc:chgData name="Stephen Desilets" userId="2df8f4c56c849a7f" providerId="LiveId" clId="{B48F43DB-3888-4FF6-B9C2-531E0ECC3ED3}" dt="2023-08-22T23:48:00.825" v="22709" actId="20577"/>
+      <pc:chgData name="Stephen Desilets" userId="2df8f4c56c849a7f" providerId="LiveId" clId="{B48F43DB-3888-4FF6-B9C2-531E0ECC3ED3}" dt="2023-08-24T19:07:31.457" v="22735" actId="20577"/>
       <pc:docMkLst>
         <pc:docMk/>
       </pc:docMkLst>
@@ -1145,7 +1145,7 @@
         </pc:cxnChg>
       </pc:sldChg>
       <pc:sldChg chg="delSp modSp add mod">
-        <pc:chgData name="Stephen Desilets" userId="2df8f4c56c849a7f" providerId="LiveId" clId="{B48F43DB-3888-4FF6-B9C2-531E0ECC3ED3}" dt="2023-08-22T23:48:00.825" v="22709" actId="20577"/>
+        <pc:chgData name="Stephen Desilets" userId="2df8f4c56c849a7f" providerId="LiveId" clId="{B48F43DB-3888-4FF6-B9C2-531E0ECC3ED3}" dt="2023-08-24T19:07:31.457" v="22735" actId="20577"/>
         <pc:sldMkLst>
           <pc:docMk/>
           <pc:sldMk cId="411543301" sldId="287"/>
@@ -1159,7 +1159,7 @@
           </ac:spMkLst>
         </pc:spChg>
         <pc:spChg chg="mod">
-          <ac:chgData name="Stephen Desilets" userId="2df8f4c56c849a7f" providerId="LiveId" clId="{B48F43DB-3888-4FF6-B9C2-531E0ECC3ED3}" dt="2023-08-10T23:14:45.823" v="3998" actId="1036"/>
+          <ac:chgData name="Stephen Desilets" userId="2df8f4c56c849a7f" providerId="LiveId" clId="{B48F43DB-3888-4FF6-B9C2-531E0ECC3ED3}" dt="2023-08-24T19:07:31.457" v="22735" actId="20577"/>
           <ac:spMkLst>
             <pc:docMk/>
             <pc:sldMk cId="411543301" sldId="287"/>
@@ -1303,7 +1303,7 @@
         </pc:spChg>
       </pc:sldChg>
       <pc:sldChg chg="delSp modSp add mod">
-        <pc:chgData name="Stephen Desilets" userId="2df8f4c56c849a7f" providerId="LiveId" clId="{B48F43DB-3888-4FF6-B9C2-531E0ECC3ED3}" dt="2023-08-17T18:53:56.367" v="22534" actId="20577"/>
+        <pc:chgData name="Stephen Desilets" userId="2df8f4c56c849a7f" providerId="LiveId" clId="{B48F43DB-3888-4FF6-B9C2-531E0ECC3ED3}" dt="2023-08-24T19:06:30.870" v="22727" actId="20577"/>
         <pc:sldMkLst>
           <pc:docMk/>
           <pc:sldMk cId="3857785275" sldId="288"/>
@@ -1317,7 +1317,7 @@
           </ac:spMkLst>
         </pc:spChg>
         <pc:spChg chg="mod">
-          <ac:chgData name="Stephen Desilets" userId="2df8f4c56c849a7f" providerId="LiveId" clId="{B48F43DB-3888-4FF6-B9C2-531E0ECC3ED3}" dt="2023-08-17T18:53:56.367" v="22534" actId="20577"/>
+          <ac:chgData name="Stephen Desilets" userId="2df8f4c56c849a7f" providerId="LiveId" clId="{B48F43DB-3888-4FF6-B9C2-531E0ECC3ED3}" dt="2023-08-24T19:06:30.870" v="22727" actId="20577"/>
           <ac:spMkLst>
             <pc:docMk/>
             <pc:sldMk cId="3857785275" sldId="288"/>
@@ -2831,7 +2831,7 @@
           <a:p>
             <a:fld id="{046326D4-DBBB-4FDF-918E-E5ACF7C59FAB}" type="datetimeFigureOut">
               <a:rPr lang="en-US" smtClean="0"/>
-              <a:t>8/22/2023</a:t>
+              <a:t>8/24/2023</a:t>
             </a:fld>
             <a:endParaRPr lang="en-US" dirty="0"/>
           </a:p>
@@ -3329,7 +3329,7 @@
           <a:p>
             <a:fld id="{6900ED20-245A-4176-8383-E64D97094D5B}" type="datetimeFigureOut">
               <a:rPr lang="en-US" smtClean="0"/>
-              <a:t>8/22/2023</a:t>
+              <a:t>8/24/2023</a:t>
             </a:fld>
             <a:endParaRPr lang="en-US" dirty="0"/>
           </a:p>
@@ -3527,7 +3527,7 @@
           <a:p>
             <a:fld id="{6900ED20-245A-4176-8383-E64D97094D5B}" type="datetimeFigureOut">
               <a:rPr lang="en-US" smtClean="0"/>
-              <a:t>8/22/2023</a:t>
+              <a:t>8/24/2023</a:t>
             </a:fld>
             <a:endParaRPr lang="en-US" dirty="0"/>
           </a:p>
@@ -3735,7 +3735,7 @@
           <a:p>
             <a:fld id="{6900ED20-245A-4176-8383-E64D97094D5B}" type="datetimeFigureOut">
               <a:rPr lang="en-US" smtClean="0"/>
-              <a:t>8/22/2023</a:t>
+              <a:t>8/24/2023</a:t>
             </a:fld>
             <a:endParaRPr lang="en-US" dirty="0"/>
           </a:p>
@@ -3933,7 +3933,7 @@
           <a:p>
             <a:fld id="{6900ED20-245A-4176-8383-E64D97094D5B}" type="datetimeFigureOut">
               <a:rPr lang="en-US" smtClean="0"/>
-              <a:t>8/22/2023</a:t>
+              <a:t>8/24/2023</a:t>
             </a:fld>
             <a:endParaRPr lang="en-US" dirty="0"/>
           </a:p>
@@ -4208,7 +4208,7 @@
           <a:p>
             <a:fld id="{6900ED20-245A-4176-8383-E64D97094D5B}" type="datetimeFigureOut">
               <a:rPr lang="en-US" smtClean="0"/>
-              <a:t>8/22/2023</a:t>
+              <a:t>8/24/2023</a:t>
             </a:fld>
             <a:endParaRPr lang="en-US" dirty="0"/>
           </a:p>
@@ -4473,7 +4473,7 @@
           <a:p>
             <a:fld id="{6900ED20-245A-4176-8383-E64D97094D5B}" type="datetimeFigureOut">
               <a:rPr lang="en-US" smtClean="0"/>
-              <a:t>8/22/2023</a:t>
+              <a:t>8/24/2023</a:t>
             </a:fld>
             <a:endParaRPr lang="en-US" dirty="0"/>
           </a:p>
@@ -4885,7 +4885,7 @@
           <a:p>
             <a:fld id="{6900ED20-245A-4176-8383-E64D97094D5B}" type="datetimeFigureOut">
               <a:rPr lang="en-US" smtClean="0"/>
-              <a:t>8/22/2023</a:t>
+              <a:t>8/24/2023</a:t>
             </a:fld>
             <a:endParaRPr lang="en-US" dirty="0"/>
           </a:p>
@@ -5026,7 +5026,7 @@
           <a:p>
             <a:fld id="{6900ED20-245A-4176-8383-E64D97094D5B}" type="datetimeFigureOut">
               <a:rPr lang="en-US" smtClean="0"/>
-              <a:t>8/22/2023</a:t>
+              <a:t>8/24/2023</a:t>
             </a:fld>
             <a:endParaRPr lang="en-US" dirty="0"/>
           </a:p>
@@ -5139,7 +5139,7 @@
           <a:p>
             <a:fld id="{6900ED20-245A-4176-8383-E64D97094D5B}" type="datetimeFigureOut">
               <a:rPr lang="en-US" smtClean="0"/>
-              <a:t>8/22/2023</a:t>
+              <a:t>8/24/2023</a:t>
             </a:fld>
             <a:endParaRPr lang="en-US" dirty="0"/>
           </a:p>
@@ -5450,7 +5450,7 @@
           <a:p>
             <a:fld id="{6900ED20-245A-4176-8383-E64D97094D5B}" type="datetimeFigureOut">
               <a:rPr lang="en-US" smtClean="0"/>
-              <a:t>8/22/2023</a:t>
+              <a:t>8/24/2023</a:t>
             </a:fld>
             <a:endParaRPr lang="en-US" dirty="0"/>
           </a:p>
@@ -5738,7 +5738,7 @@
           <a:p>
             <a:fld id="{6900ED20-245A-4176-8383-E64D97094D5B}" type="datetimeFigureOut">
               <a:rPr lang="en-US" smtClean="0"/>
-              <a:t>8/22/2023</a:t>
+              <a:t>8/24/2023</a:t>
             </a:fld>
             <a:endParaRPr lang="en-US" dirty="0"/>
           </a:p>
@@ -5979,7 +5979,7 @@
           <a:p>
             <a:fld id="{6900ED20-245A-4176-8383-E64D97094D5B}" type="datetimeFigureOut">
               <a:rPr lang="en-US" smtClean="0"/>
-              <a:t>8/22/2023</a:t>
+              <a:t>8/24/2023</a:t>
             </a:fld>
             <a:endParaRPr lang="en-US" dirty="0"/>
           </a:p>
@@ -12660,7 +12660,7 @@
             </a:pPr>
             <a:r>
               <a:rPr lang="en-US" sz="1200" dirty="0"/>
-              <a:t>Our team generated and reviewed a sensitivity report for this linear programming problem using GLPK and Gurobi in Python. The sensitivity report contained information regarding the 370 constraints and the 57 variables. Below, we summarize key findings from our review of this sensitivity report.</a:t>
+              <a:t>Our team generated and reviewed sensitivity reports for this integer linear programming problem using GLPK and Gurobi in Python. The sensitivity reports contained information regarding the 370 constraints and the 57 variables. Below, we summarize key findings from our review of these sensitivity reports.</a:t>
             </a:r>
           </a:p>
         </p:txBody>
@@ -12972,7 +12972,7 @@
             </a:pPr>
             <a:r>
               <a:rPr lang="en-US" sz="1200" dirty="0"/>
-              <a:t>While our robust linear programming analysis provides this brewing company with amazing insights into how to minimize their transportation and distribution costs, there exist opportunities for researchers to expand upon the findings of this study to support the brewing company even more.</a:t>
+              <a:t>While our robust integer linear programming analysis provides this brewing company with amazing insights into how to minimize their transportation and distribution costs, there exist opportunities for researchers to expand upon the findings of this study to support the brewing company even more.</a:t>
             </a:r>
           </a:p>
         </p:txBody>

</xml_diff>